<commit_message>
Add some infos to the presentation.
</commit_message>
<xml_diff>
--- a/doc/ThreeLayeredArchitectureWithSitecore.pptx
+++ b/doc/ThreeLayeredArchitectureWithSitecore.pptx
@@ -5,7 +5,7 @@
     <p:sldMasterId id="2147483660" r:id="rId1"/>
   </p:sldMasterIdLst>
   <p:notesMasterIdLst>
-    <p:notesMasterId r:id="rId14"/>
+    <p:notesMasterId r:id="rId17"/>
   </p:notesMasterIdLst>
   <p:sldIdLst>
     <p:sldId id="256" r:id="rId2"/>
@@ -14,12 +14,15 @@
     <p:sldId id="262" r:id="rId5"/>
     <p:sldId id="259" r:id="rId6"/>
     <p:sldId id="265" r:id="rId7"/>
-    <p:sldId id="261" r:id="rId8"/>
-    <p:sldId id="266" r:id="rId9"/>
-    <p:sldId id="267" r:id="rId10"/>
-    <p:sldId id="260" r:id="rId11"/>
-    <p:sldId id="263" r:id="rId12"/>
-    <p:sldId id="264" r:id="rId13"/>
+    <p:sldId id="269" r:id="rId8"/>
+    <p:sldId id="261" r:id="rId9"/>
+    <p:sldId id="270" r:id="rId10"/>
+    <p:sldId id="266" r:id="rId11"/>
+    <p:sldId id="267" r:id="rId12"/>
+    <p:sldId id="260" r:id="rId13"/>
+    <p:sldId id="263" r:id="rId14"/>
+    <p:sldId id="264" r:id="rId15"/>
+    <p:sldId id="268" r:id="rId16"/>
   </p:sldIdLst>
   <p:sldSz cx="12192000" cy="6858000"/>
   <p:notesSz cx="6858000" cy="9144000"/>
@@ -367,7 +370,7 @@
           <a:p>
             <a:fld id="{D84A27AA-9F5E-4F01-A23B-9E06CF66E53B}" type="slidenum">
               <a:rPr lang="de-CH" smtClean="0"/>
-              <a:t>‹Nr.›</a:t>
+              <a:t>‹#›</a:t>
             </a:fld>
             <a:endParaRPr lang="de-CH"/>
           </a:p>
@@ -728,6 +731,90 @@
 </p:notes>
 </file>
 
+<file path=ppt/notesSlides/notesSlide4.xml><?xml version="1.0" encoding="utf-8"?>
+<p:notes xmlns:a="http://schemas.openxmlformats.org/drawingml/2006/main" xmlns:r="http://schemas.openxmlformats.org/officeDocument/2006/relationships" xmlns:p="http://schemas.openxmlformats.org/presentationml/2006/main">
+  <p:cSld>
+    <p:spTree>
+      <p:nvGrpSpPr>
+        <p:cNvPr id="1" name=""/>
+        <p:cNvGrpSpPr/>
+        <p:nvPr/>
+      </p:nvGrpSpPr>
+      <p:grpSpPr>
+        <a:xfrm>
+          <a:off x="0" y="0"/>
+          <a:ext cx="0" cy="0"/>
+          <a:chOff x="0" y="0"/>
+          <a:chExt cx="0" cy="0"/>
+        </a:xfrm>
+      </p:grpSpPr>
+      <p:sp>
+        <p:nvSpPr>
+          <p:cNvPr id="2" name="Slide Image Placeholder 1"/>
+          <p:cNvSpPr>
+            <a:spLocks noGrp="1" noRot="1" noChangeAspect="1"/>
+          </p:cNvSpPr>
+          <p:nvPr>
+            <p:ph type="sldImg"/>
+          </p:nvPr>
+        </p:nvSpPr>
+        <p:spPr/>
+      </p:sp>
+      <p:sp>
+        <p:nvSpPr>
+          <p:cNvPr id="3" name="Notes Placeholder 2"/>
+          <p:cNvSpPr>
+            <a:spLocks noGrp="1"/>
+          </p:cNvSpPr>
+          <p:nvPr>
+            <p:ph type="body" idx="1"/>
+          </p:nvPr>
+        </p:nvSpPr>
+        <p:spPr/>
+        <p:txBody>
+          <a:bodyPr/>
+          <a:lstStyle/>
+          <a:p>
+            <a:endParaRPr lang="de-CH"/>
+          </a:p>
+        </p:txBody>
+      </p:sp>
+      <p:sp>
+        <p:nvSpPr>
+          <p:cNvPr id="4" name="Slide Number Placeholder 3"/>
+          <p:cNvSpPr>
+            <a:spLocks noGrp="1"/>
+          </p:cNvSpPr>
+          <p:nvPr>
+            <p:ph type="sldNum" sz="quarter" idx="10"/>
+          </p:nvPr>
+        </p:nvSpPr>
+        <p:spPr/>
+        <p:txBody>
+          <a:bodyPr/>
+          <a:lstStyle/>
+          <a:p>
+            <a:fld id="{D84A27AA-9F5E-4F01-A23B-9E06CF66E53B}" type="slidenum">
+              <a:rPr lang="de-CH" smtClean="0"/>
+              <a:t>7</a:t>
+            </a:fld>
+            <a:endParaRPr lang="de-CH"/>
+          </a:p>
+        </p:txBody>
+      </p:sp>
+    </p:spTree>
+    <p:extLst>
+      <p:ext uri="{BB962C8B-B14F-4D97-AF65-F5344CB8AC3E}">
+        <p14:creationId xmlns:p14="http://schemas.microsoft.com/office/powerpoint/2010/main" val="121871375"/>
+      </p:ext>
+    </p:extLst>
+  </p:cSld>
+  <p:clrMapOvr>
+    <a:masterClrMapping/>
+  </p:clrMapOvr>
+</p:notes>
+</file>
+
 <file path=ppt/slideLayouts/slideLayout1.xml><?xml version="1.0" encoding="utf-8"?>
 <p:sldLayout xmlns:a="http://schemas.openxmlformats.org/drawingml/2006/main" xmlns:r="http://schemas.openxmlformats.org/officeDocument/2006/relationships" xmlns:p="http://schemas.openxmlformats.org/presentationml/2006/main" type="title" preserve="1">
   <p:cSld name="Title Slide">
@@ -994,7 +1081,7 @@
           <a:p>
             <a:fld id="{81DCBBB0-5E34-4DBA-AD1D-DC86F57A7ECD}" type="slidenum">
               <a:rPr lang="de-CH" smtClean="0"/>
-              <a:t>‹Nr.›</a:t>
+              <a:t>‹#›</a:t>
             </a:fld>
             <a:endParaRPr lang="de-CH"/>
           </a:p>
@@ -1175,7 +1262,7 @@
           <a:p>
             <a:fld id="{81DCBBB0-5E34-4DBA-AD1D-DC86F57A7ECD}" type="slidenum">
               <a:rPr lang="de-CH" smtClean="0"/>
-              <a:t>‹Nr.›</a:t>
+              <a:t>‹#›</a:t>
             </a:fld>
             <a:endParaRPr lang="de-CH"/>
           </a:p>
@@ -1359,7 +1446,7 @@
           <a:p>
             <a:fld id="{81DCBBB0-5E34-4DBA-AD1D-DC86F57A7ECD}" type="slidenum">
               <a:rPr lang="de-CH" smtClean="0"/>
-              <a:t>‹Nr.›</a:t>
+              <a:t>‹#›</a:t>
             </a:fld>
             <a:endParaRPr lang="de-CH"/>
           </a:p>
@@ -1533,7 +1620,7 @@
           <a:p>
             <a:fld id="{81DCBBB0-5E34-4DBA-AD1D-DC86F57A7ECD}" type="slidenum">
               <a:rPr lang="de-CH" smtClean="0"/>
-              <a:t>‹Nr.›</a:t>
+              <a:t>‹#›</a:t>
             </a:fld>
             <a:endParaRPr lang="de-CH"/>
           </a:p>
@@ -1800,7 +1887,7 @@
           <a:p>
             <a:fld id="{81DCBBB0-5E34-4DBA-AD1D-DC86F57A7ECD}" type="slidenum">
               <a:rPr lang="de-CH" smtClean="0"/>
-              <a:t>‹Nr.›</a:t>
+              <a:t>‹#›</a:t>
             </a:fld>
             <a:endParaRPr lang="de-CH"/>
           </a:p>
@@ -2099,7 +2186,7 @@
           <a:p>
             <a:fld id="{81DCBBB0-5E34-4DBA-AD1D-DC86F57A7ECD}" type="slidenum">
               <a:rPr lang="de-CH" smtClean="0"/>
-              <a:t>‹Nr.›</a:t>
+              <a:t>‹#›</a:t>
             </a:fld>
             <a:endParaRPr lang="de-CH"/>
           </a:p>
@@ -2548,7 +2635,7 @@
           <a:p>
             <a:fld id="{81DCBBB0-5E34-4DBA-AD1D-DC86F57A7ECD}" type="slidenum">
               <a:rPr lang="de-CH" smtClean="0"/>
-              <a:t>‹Nr.›</a:t>
+              <a:t>‹#›</a:t>
             </a:fld>
             <a:endParaRPr lang="de-CH"/>
           </a:p>
@@ -2670,7 +2757,7 @@
           <a:p>
             <a:fld id="{81DCBBB0-5E34-4DBA-AD1D-DC86F57A7ECD}" type="slidenum">
               <a:rPr lang="de-CH" smtClean="0"/>
-              <a:t>‹Nr.›</a:t>
+              <a:t>‹#›</a:t>
             </a:fld>
             <a:endParaRPr lang="de-CH"/>
           </a:p>
@@ -2769,7 +2856,7 @@
           <a:p>
             <a:fld id="{81DCBBB0-5E34-4DBA-AD1D-DC86F57A7ECD}" type="slidenum">
               <a:rPr lang="de-CH" smtClean="0"/>
-              <a:t>‹Nr.›</a:t>
+              <a:t>‹#›</a:t>
             </a:fld>
             <a:endParaRPr lang="de-CH"/>
           </a:p>
@@ -3139,7 +3226,7 @@
           <a:p>
             <a:fld id="{81DCBBB0-5E34-4DBA-AD1D-DC86F57A7ECD}" type="slidenum">
               <a:rPr lang="de-CH" smtClean="0"/>
-              <a:t>‹Nr.›</a:t>
+              <a:t>‹#›</a:t>
             </a:fld>
             <a:endParaRPr lang="de-CH"/>
           </a:p>
@@ -3469,7 +3556,7 @@
           <a:p>
             <a:fld id="{81DCBBB0-5E34-4DBA-AD1D-DC86F57A7ECD}" type="slidenum">
               <a:rPr lang="de-CH" smtClean="0"/>
-              <a:t>‹Nr.›</a:t>
+              <a:t>‹#›</a:t>
             </a:fld>
             <a:endParaRPr lang="de-CH"/>
           </a:p>
@@ -3726,7 +3813,7 @@
           <a:p>
             <a:fld id="{81DCBBB0-5E34-4DBA-AD1D-DC86F57A7ECD}" type="slidenum">
               <a:rPr lang="de-CH" smtClean="0"/>
-              <a:t>‹Nr.›</a:t>
+              <a:t>‹#›</a:t>
             </a:fld>
             <a:endParaRPr lang="de-CH"/>
           </a:p>
@@ -4217,7 +4304,7 @@
           <a:p>
             <a:r>
               <a:rPr lang="de-CH" dirty="0" smtClean="0"/>
-              <a:t>Demo</a:t>
+              <a:t>Glass Mapper</a:t>
             </a:r>
             <a:endParaRPr lang="de-CH" dirty="0"/>
           </a:p>
@@ -4243,16 +4330,8 @@
               <a:buChar char="§"/>
             </a:pPr>
             <a:r>
-              <a:rPr lang="en-US" dirty="0" smtClean="0"/>
-              <a:t> Show list of news in a </a:t>
-            </a:r>
-            <a:r>
-              <a:rPr lang="en-US" dirty="0" err="1" smtClean="0"/>
-              <a:t>Sitecore</a:t>
-            </a:r>
-            <a:r>
-              <a:rPr lang="en-US" dirty="0" smtClean="0"/>
-              <a:t> MVC controller rendering</a:t>
+              <a:rPr lang="de-CH" dirty="0" smtClean="0"/>
+              <a:t> ORM (object-relational mapping) for Sitecore</a:t>
             </a:r>
           </a:p>
           <a:p>
@@ -4261,20 +4340,12 @@
               <a:buChar char="§"/>
             </a:pPr>
             <a:r>
-              <a:rPr lang="en-US" dirty="0"/>
+              <a:rPr lang="de-CH" dirty="0"/>
               <a:t> </a:t>
             </a:r>
             <a:r>
-              <a:rPr lang="en-US" dirty="0" smtClean="0"/>
-              <a:t>Sort </a:t>
-            </a:r>
-            <a:r>
-              <a:rPr lang="en-US" smtClean="0"/>
-              <a:t>them descending </a:t>
-            </a:r>
-            <a:r>
-              <a:rPr lang="en-US" dirty="0" smtClean="0"/>
-              <a:t>by date</a:t>
+              <a:rPr lang="de-CH" dirty="0" smtClean="0"/>
+              <a:t>Maps Sitecore items to strongly typed objects</a:t>
             </a:r>
           </a:p>
           <a:p>
@@ -4282,14 +4353,7 @@
               <a:buFont typeface="Wingdings" panose="05000000000000000000" pitchFamily="2" charset="2"/>
               <a:buChar char="§"/>
             </a:pPr>
-            <a:r>
-              <a:rPr lang="en-US" dirty="0"/>
-              <a:t> </a:t>
-            </a:r>
-            <a:r>
-              <a:rPr lang="en-US" dirty="0" smtClean="0"/>
-              <a:t>Get the items via Glass Mapper</a:t>
-            </a:r>
+            <a:endParaRPr lang="de-CH" dirty="0"/>
           </a:p>
           <a:p>
             <a:pPr>
@@ -4297,17 +4361,81 @@
               <a:buChar char="§"/>
             </a:pPr>
             <a:r>
-              <a:rPr lang="en-US" dirty="0"/>
+              <a:rPr lang="de-CH" dirty="0"/>
               <a:t> </a:t>
             </a:r>
             <a:r>
-              <a:rPr lang="en-US" dirty="0" smtClean="0"/>
-              <a:t>Abstract different layers into different Visual Studio projects</a:t>
+              <a:rPr lang="de-CH" dirty="0">
+                <a:hlinkClick r:id="rId2"/>
+              </a:rPr>
+              <a:t>http://glass.lu</a:t>
+            </a:r>
+            <a:r>
+              <a:rPr lang="de-CH" dirty="0" smtClean="0">
+                <a:hlinkClick r:id="rId2"/>
+              </a:rPr>
+              <a:t>/</a:t>
             </a:r>
             <a:endParaRPr lang="de-CH" dirty="0" smtClean="0"/>
           </a:p>
-        </p:txBody>
-      </p:sp>
+          <a:p>
+            <a:pPr>
+              <a:buFont typeface="Wingdings" panose="05000000000000000000" pitchFamily="2" charset="2"/>
+              <a:buChar char="§"/>
+            </a:pPr>
+            <a:r>
+              <a:rPr lang="de-CH" dirty="0"/>
+              <a:t> </a:t>
+            </a:r>
+            <a:r>
+              <a:rPr lang="de-CH" dirty="0" smtClean="0"/>
+              <a:t>Available via NuGet</a:t>
+            </a:r>
+            <a:endParaRPr lang="de-CH" dirty="0"/>
+          </a:p>
+        </p:txBody>
+      </p:sp>
+      <p:pic>
+        <p:nvPicPr>
+          <p:cNvPr id="1026" name="Picture 2" descr="http://glass.lu/~/media/Images/Common/logo-250-with-border.ashx?w=150&amp;data_id=myvalue"/>
+          <p:cNvPicPr>
+            <a:picLocks noChangeAspect="1" noChangeArrowheads="1"/>
+          </p:cNvPicPr>
+          <p:nvPr/>
+        </p:nvPicPr>
+        <p:blipFill>
+          <a:blip r:embed="rId3">
+            <a:extLst>
+              <a:ext uri="{28A0092B-C50C-407E-A947-70E740481C1C}">
+                <a14:useLocalDpi xmlns:a14="http://schemas.microsoft.com/office/drawing/2010/main" val="0"/>
+              </a:ext>
+            </a:extLst>
+          </a:blip>
+          <a:srcRect/>
+          <a:stretch>
+            <a:fillRect/>
+          </a:stretch>
+        </p:blipFill>
+        <p:spPr bwMode="auto">
+          <a:xfrm>
+            <a:off x="8480454" y="1671382"/>
+            <a:ext cx="2296416" cy="2296416"/>
+          </a:xfrm>
+          <a:prstGeom prst="rect">
+            <a:avLst/>
+          </a:prstGeom>
+          <a:noFill/>
+          <a:extLst>
+            <a:ext uri="{909E8E84-426E-40DD-AFC4-6F175D3DCCD1}">
+              <a14:hiddenFill xmlns:a14="http://schemas.microsoft.com/office/drawing/2010/main">
+                <a:solidFill>
+                  <a:srgbClr val="FFFFFF"/>
+                </a:solidFill>
+              </a14:hiddenFill>
+            </a:ext>
+          </a:extLst>
+        </p:spPr>
+      </p:pic>
       <p:sp>
         <p:nvSpPr>
           <p:cNvPr id="4" name="Date Placeholder 3"/>
@@ -4357,7 +4485,7 @@
     </p:spTree>
     <p:extLst>
       <p:ext uri="{BB962C8B-B14F-4D97-AF65-F5344CB8AC3E}">
-        <p14:creationId xmlns:p14="http://schemas.microsoft.com/office/powerpoint/2010/main" val="2982463522"/>
+        <p14:creationId xmlns:p14="http://schemas.microsoft.com/office/powerpoint/2010/main" val="2705697736"/>
       </p:ext>
     </p:extLst>
   </p:cSld>
@@ -4408,7 +4536,7 @@
           <a:p>
             <a:r>
               <a:rPr lang="de-CH" dirty="0" smtClean="0"/>
-              <a:t>Recap</a:t>
+              <a:t>Ninject</a:t>
             </a:r>
             <a:endParaRPr lang="de-CH" dirty="0"/>
           </a:p>
@@ -4435,7 +4563,7 @@
             </a:pPr>
             <a:r>
               <a:rPr lang="de-CH" dirty="0" smtClean="0"/>
-              <a:t> It’s very easy to build a three-layered architecture</a:t>
+              <a:t> Very easy dependency injection framework</a:t>
             </a:r>
           </a:p>
           <a:p>
@@ -4449,7 +4577,7 @@
             </a:r>
             <a:r>
               <a:rPr lang="de-CH" dirty="0" smtClean="0"/>
-              <a:t>Easy to understand and easy to maintain</a:t>
+              <a:t>Supports ASP.net MVC controller injection</a:t>
             </a:r>
           </a:p>
           <a:p>
@@ -4463,7 +4591,7 @@
             </a:r>
             <a:r>
               <a:rPr lang="de-CH" dirty="0" smtClean="0"/>
-              <a:t>We can abstract a lot and have many advantages</a:t>
+              <a:t>Of course you can use another framework as well</a:t>
             </a:r>
           </a:p>
           <a:p>
@@ -4479,13 +4607,84 @@
               <a:buChar char="§"/>
             </a:pPr>
             <a:r>
+              <a:rPr lang="de-CH" dirty="0"/>
+              <a:t> </a:t>
+            </a:r>
+            <a:r>
+              <a:rPr lang="de-CH" dirty="0">
+                <a:hlinkClick r:id="rId2"/>
+              </a:rPr>
+              <a:t>http://www.ninject.org</a:t>
+            </a:r>
+            <a:r>
+              <a:rPr lang="de-CH" dirty="0" smtClean="0">
+                <a:hlinkClick r:id="rId2"/>
+              </a:rPr>
+              <a:t>/</a:t>
+            </a:r>
+            <a:r>
               <a:rPr lang="de-CH" dirty="0" smtClean="0"/>
-              <a:t> It makes developer lifes easier and the code cleaner</a:t>
+              <a:t> </a:t>
+            </a:r>
+          </a:p>
+          <a:p>
+            <a:pPr>
+              <a:buFont typeface="Wingdings" panose="05000000000000000000" pitchFamily="2" charset="2"/>
+              <a:buChar char="§"/>
+            </a:pPr>
+            <a:r>
+              <a:rPr lang="de-CH" dirty="0"/>
+              <a:t> </a:t>
+            </a:r>
+            <a:r>
+              <a:rPr lang="de-CH" dirty="0" smtClean="0"/>
+              <a:t>Available via NuGet</a:t>
             </a:r>
             <a:endParaRPr lang="de-CH" dirty="0"/>
           </a:p>
         </p:txBody>
       </p:sp>
+      <p:pic>
+        <p:nvPicPr>
+          <p:cNvPr id="2054" name="Picture 6" descr="http://rlv.zcache.com/isapi/designall.dll?rlvnet=1&amp;realview=113228992575404873&amp;design=5ade5fc9-35ed-4f95-978d-86de1e25a069&amp;size=1.5&amp;style=round_sticker&amp;wm=0&amp;pending=false&amp;pdt=zazzle_sticker&amp;max_dim=512"/>
+          <p:cNvPicPr>
+            <a:picLocks noChangeAspect="1" noChangeArrowheads="1"/>
+          </p:cNvPicPr>
+          <p:nvPr/>
+        </p:nvPicPr>
+        <p:blipFill>
+          <a:blip r:embed="rId3">
+            <a:extLst>
+              <a:ext uri="{28A0092B-C50C-407E-A947-70E740481C1C}">
+                <a14:useLocalDpi xmlns:a14="http://schemas.microsoft.com/office/drawing/2010/main" val="0"/>
+              </a:ext>
+            </a:extLst>
+          </a:blip>
+          <a:srcRect/>
+          <a:stretch>
+            <a:fillRect/>
+          </a:stretch>
+        </p:blipFill>
+        <p:spPr bwMode="auto">
+          <a:xfrm>
+            <a:off x="7972271" y="1238081"/>
+            <a:ext cx="2991566" cy="2991567"/>
+          </a:xfrm>
+          <a:prstGeom prst="rect">
+            <a:avLst/>
+          </a:prstGeom>
+          <a:noFill/>
+          <a:extLst>
+            <a:ext uri="{909E8E84-426E-40DD-AFC4-6F175D3DCCD1}">
+              <a14:hiddenFill xmlns:a14="http://schemas.microsoft.com/office/drawing/2010/main">
+                <a:solidFill>
+                  <a:srgbClr val="FFFFFF"/>
+                </a:solidFill>
+              </a14:hiddenFill>
+            </a:ext>
+          </a:extLst>
+        </p:spPr>
+      </p:pic>
       <p:sp>
         <p:nvSpPr>
           <p:cNvPr id="4" name="Date Placeholder 3"/>
@@ -4535,7 +4734,7 @@
     </p:spTree>
     <p:extLst>
       <p:ext uri="{BB962C8B-B14F-4D97-AF65-F5344CB8AC3E}">
-        <p14:creationId xmlns:p14="http://schemas.microsoft.com/office/powerpoint/2010/main" val="57922901"/>
+        <p14:creationId xmlns:p14="http://schemas.microsoft.com/office/powerpoint/2010/main" val="5611312"/>
       </p:ext>
     </p:extLst>
   </p:cSld>
@@ -4586,7 +4785,7 @@
           <a:p>
             <a:r>
               <a:rPr lang="de-CH" dirty="0" smtClean="0"/>
-              <a:t>Resources</a:t>
+              <a:t>Demo</a:t>
             </a:r>
             <a:endParaRPr lang="de-CH" dirty="0"/>
           </a:p>
@@ -4612,6 +4811,402 @@
               <a:buChar char="§"/>
             </a:pPr>
             <a:r>
+              <a:rPr lang="en-US" dirty="0" smtClean="0"/>
+              <a:t> Show list of news in a </a:t>
+            </a:r>
+            <a:r>
+              <a:rPr lang="en-US" dirty="0" err="1" smtClean="0"/>
+              <a:t>Sitecore</a:t>
+            </a:r>
+            <a:r>
+              <a:rPr lang="en-US" dirty="0" smtClean="0"/>
+              <a:t> MVC controller rendering</a:t>
+            </a:r>
+          </a:p>
+          <a:p>
+            <a:pPr>
+              <a:buFont typeface="Wingdings" panose="05000000000000000000" pitchFamily="2" charset="2"/>
+              <a:buChar char="§"/>
+            </a:pPr>
+            <a:r>
+              <a:rPr lang="en-US" dirty="0"/>
+              <a:t> </a:t>
+            </a:r>
+            <a:r>
+              <a:rPr lang="en-US" dirty="0" smtClean="0"/>
+              <a:t>Sort </a:t>
+            </a:r>
+            <a:r>
+              <a:rPr lang="en-US" smtClean="0"/>
+              <a:t>them descending </a:t>
+            </a:r>
+            <a:r>
+              <a:rPr lang="en-US" dirty="0" smtClean="0"/>
+              <a:t>by date</a:t>
+            </a:r>
+          </a:p>
+          <a:p>
+            <a:pPr>
+              <a:buFont typeface="Wingdings" panose="05000000000000000000" pitchFamily="2" charset="2"/>
+              <a:buChar char="§"/>
+            </a:pPr>
+            <a:r>
+              <a:rPr lang="en-US" dirty="0"/>
+              <a:t> </a:t>
+            </a:r>
+            <a:r>
+              <a:rPr lang="en-US" dirty="0" smtClean="0"/>
+              <a:t>Get the items via Glass Mapper</a:t>
+            </a:r>
+          </a:p>
+          <a:p>
+            <a:pPr>
+              <a:buFont typeface="Wingdings" panose="05000000000000000000" pitchFamily="2" charset="2"/>
+              <a:buChar char="§"/>
+            </a:pPr>
+            <a:r>
+              <a:rPr lang="en-US" dirty="0"/>
+              <a:t> </a:t>
+            </a:r>
+            <a:r>
+              <a:rPr lang="en-US" dirty="0" smtClean="0"/>
+              <a:t>Abstract different layers into different Visual Studio projects</a:t>
+            </a:r>
+            <a:endParaRPr lang="de-CH" dirty="0" smtClean="0"/>
+          </a:p>
+        </p:txBody>
+      </p:sp>
+      <p:sp>
+        <p:nvSpPr>
+          <p:cNvPr id="4" name="Date Placeholder 3"/>
+          <p:cNvSpPr>
+            <a:spLocks noGrp="1"/>
+          </p:cNvSpPr>
+          <p:nvPr>
+            <p:ph type="dt" sz="half" idx="10"/>
+          </p:nvPr>
+        </p:nvSpPr>
+        <p:spPr/>
+        <p:txBody>
+          <a:bodyPr/>
+          <a:lstStyle/>
+          <a:p>
+            <a:r>
+              <a:rPr lang="de-DE" smtClean="0"/>
+              <a:t>04.11.2014</a:t>
+            </a:r>
+            <a:endParaRPr lang="de-CH" dirty="0"/>
+          </a:p>
+        </p:txBody>
+      </p:sp>
+      <p:sp>
+        <p:nvSpPr>
+          <p:cNvPr id="5" name="Footer Placeholder 4"/>
+          <p:cNvSpPr>
+            <a:spLocks noGrp="1"/>
+          </p:cNvSpPr>
+          <p:nvPr>
+            <p:ph type="ftr" sz="quarter" idx="11"/>
+          </p:nvPr>
+        </p:nvSpPr>
+        <p:spPr/>
+        <p:txBody>
+          <a:bodyPr/>
+          <a:lstStyle/>
+          <a:p>
+            <a:r>
+              <a:rPr lang="de-CH" smtClean="0"/>
+              <a:t>Sitecore User Group Switzerland 2014 – Kevin Brechbühl</a:t>
+            </a:r>
+            <a:endParaRPr lang="de-CH" dirty="0"/>
+          </a:p>
+        </p:txBody>
+      </p:sp>
+    </p:spTree>
+    <p:extLst>
+      <p:ext uri="{BB962C8B-B14F-4D97-AF65-F5344CB8AC3E}">
+        <p14:creationId xmlns:p14="http://schemas.microsoft.com/office/powerpoint/2010/main" val="2982463522"/>
+      </p:ext>
+    </p:extLst>
+  </p:cSld>
+  <p:clrMapOvr>
+    <a:masterClrMapping/>
+  </p:clrMapOvr>
+  <p:timing>
+    <p:tnLst>
+      <p:par>
+        <p:cTn id="1" dur="indefinite" restart="never" nodeType="tmRoot"/>
+      </p:par>
+    </p:tnLst>
+  </p:timing>
+</p:sld>
+</file>
+
+<file path=ppt/slides/slide13.xml><?xml version="1.0" encoding="utf-8"?>
+<p:sld xmlns:a="http://schemas.openxmlformats.org/drawingml/2006/main" xmlns:r="http://schemas.openxmlformats.org/officeDocument/2006/relationships" xmlns:p="http://schemas.openxmlformats.org/presentationml/2006/main">
+  <p:cSld>
+    <p:spTree>
+      <p:nvGrpSpPr>
+        <p:cNvPr id="1" name=""/>
+        <p:cNvGrpSpPr/>
+        <p:nvPr/>
+      </p:nvGrpSpPr>
+      <p:grpSpPr>
+        <a:xfrm>
+          <a:off x="0" y="0"/>
+          <a:ext cx="0" cy="0"/>
+          <a:chOff x="0" y="0"/>
+          <a:chExt cx="0" cy="0"/>
+        </a:xfrm>
+      </p:grpSpPr>
+      <p:sp>
+        <p:nvSpPr>
+          <p:cNvPr id="2" name="Title 1"/>
+          <p:cNvSpPr>
+            <a:spLocks noGrp="1"/>
+          </p:cNvSpPr>
+          <p:nvPr>
+            <p:ph type="title"/>
+          </p:nvPr>
+        </p:nvSpPr>
+        <p:spPr/>
+        <p:txBody>
+          <a:bodyPr/>
+          <a:lstStyle/>
+          <a:p>
+            <a:r>
+              <a:rPr lang="de-CH" dirty="0" smtClean="0"/>
+              <a:t>Recap</a:t>
+            </a:r>
+            <a:endParaRPr lang="de-CH" dirty="0"/>
+          </a:p>
+        </p:txBody>
+      </p:sp>
+      <p:sp>
+        <p:nvSpPr>
+          <p:cNvPr id="3" name="Content Placeholder 2"/>
+          <p:cNvSpPr>
+            <a:spLocks noGrp="1"/>
+          </p:cNvSpPr>
+          <p:nvPr>
+            <p:ph idx="1"/>
+          </p:nvPr>
+        </p:nvSpPr>
+        <p:spPr/>
+        <p:txBody>
+          <a:bodyPr/>
+          <a:lstStyle/>
+          <a:p>
+            <a:pPr>
+              <a:buFont typeface="Wingdings" panose="05000000000000000000" pitchFamily="2" charset="2"/>
+              <a:buChar char="§"/>
+            </a:pPr>
+            <a:r>
+              <a:rPr lang="de-CH" dirty="0" smtClean="0"/>
+              <a:t> It’s very easy to build a three-layered architecture</a:t>
+            </a:r>
+          </a:p>
+          <a:p>
+            <a:pPr>
+              <a:buFont typeface="Wingdings" panose="05000000000000000000" pitchFamily="2" charset="2"/>
+              <a:buChar char="§"/>
+            </a:pPr>
+            <a:r>
+              <a:rPr lang="de-CH" dirty="0"/>
+              <a:t> </a:t>
+            </a:r>
+            <a:r>
+              <a:rPr lang="de-CH" dirty="0" smtClean="0"/>
+              <a:t>Easy to understand and easy to maintain</a:t>
+            </a:r>
+          </a:p>
+          <a:p>
+            <a:pPr>
+              <a:buFont typeface="Wingdings" panose="05000000000000000000" pitchFamily="2" charset="2"/>
+              <a:buChar char="§"/>
+            </a:pPr>
+            <a:r>
+              <a:rPr lang="de-CH" dirty="0"/>
+              <a:t> </a:t>
+            </a:r>
+            <a:r>
+              <a:rPr lang="de-CH" dirty="0" smtClean="0"/>
+              <a:t>We can abstract a lot and have many </a:t>
+            </a:r>
+            <a:r>
+              <a:rPr lang="de-CH" dirty="0" smtClean="0"/>
+              <a:t>advantages</a:t>
+            </a:r>
+          </a:p>
+          <a:p>
+            <a:pPr>
+              <a:buFont typeface="Wingdings" panose="05000000000000000000" pitchFamily="2" charset="2"/>
+              <a:buChar char="§"/>
+            </a:pPr>
+            <a:r>
+              <a:rPr lang="de-CH" dirty="0"/>
+              <a:t> </a:t>
+            </a:r>
+            <a:r>
+              <a:rPr lang="de-CH" dirty="0" smtClean="0"/>
+              <a:t>We can mock the data layer e.g. For unit </a:t>
+            </a:r>
+            <a:r>
+              <a:rPr lang="de-CH" dirty="0"/>
+              <a:t>t</a:t>
+            </a:r>
+            <a:r>
+              <a:rPr lang="de-CH" dirty="0" smtClean="0"/>
+              <a:t>ests</a:t>
+            </a:r>
+            <a:endParaRPr lang="de-CH" dirty="0" smtClean="0"/>
+          </a:p>
+          <a:p>
+            <a:pPr>
+              <a:buFont typeface="Wingdings" panose="05000000000000000000" pitchFamily="2" charset="2"/>
+              <a:buChar char="§"/>
+            </a:pPr>
+            <a:endParaRPr lang="de-CH" dirty="0"/>
+          </a:p>
+          <a:p>
+            <a:pPr>
+              <a:buFont typeface="Wingdings" panose="05000000000000000000" pitchFamily="2" charset="2"/>
+              <a:buChar char="§"/>
+            </a:pPr>
+            <a:r>
+              <a:rPr lang="de-CH" dirty="0" smtClean="0"/>
+              <a:t> It makes developer lifes easier and the code cleaner</a:t>
+            </a:r>
+            <a:endParaRPr lang="de-CH" dirty="0"/>
+          </a:p>
+        </p:txBody>
+      </p:sp>
+      <p:sp>
+        <p:nvSpPr>
+          <p:cNvPr id="4" name="Date Placeholder 3"/>
+          <p:cNvSpPr>
+            <a:spLocks noGrp="1"/>
+          </p:cNvSpPr>
+          <p:nvPr>
+            <p:ph type="dt" sz="half" idx="10"/>
+          </p:nvPr>
+        </p:nvSpPr>
+        <p:spPr/>
+        <p:txBody>
+          <a:bodyPr/>
+          <a:lstStyle/>
+          <a:p>
+            <a:r>
+              <a:rPr lang="de-DE" smtClean="0"/>
+              <a:t>04.11.2014</a:t>
+            </a:r>
+            <a:endParaRPr lang="de-CH" dirty="0"/>
+          </a:p>
+        </p:txBody>
+      </p:sp>
+      <p:sp>
+        <p:nvSpPr>
+          <p:cNvPr id="5" name="Footer Placeholder 4"/>
+          <p:cNvSpPr>
+            <a:spLocks noGrp="1"/>
+          </p:cNvSpPr>
+          <p:nvPr>
+            <p:ph type="ftr" sz="quarter" idx="11"/>
+          </p:nvPr>
+        </p:nvSpPr>
+        <p:spPr/>
+        <p:txBody>
+          <a:bodyPr/>
+          <a:lstStyle/>
+          <a:p>
+            <a:r>
+              <a:rPr lang="de-CH" smtClean="0"/>
+              <a:t>Sitecore User Group Switzerland 2014 – Kevin Brechbühl</a:t>
+            </a:r>
+            <a:endParaRPr lang="de-CH" dirty="0"/>
+          </a:p>
+        </p:txBody>
+      </p:sp>
+    </p:spTree>
+    <p:extLst>
+      <p:ext uri="{BB962C8B-B14F-4D97-AF65-F5344CB8AC3E}">
+        <p14:creationId xmlns:p14="http://schemas.microsoft.com/office/powerpoint/2010/main" val="57922901"/>
+      </p:ext>
+    </p:extLst>
+  </p:cSld>
+  <p:clrMapOvr>
+    <a:masterClrMapping/>
+  </p:clrMapOvr>
+  <p:timing>
+    <p:tnLst>
+      <p:par>
+        <p:cTn id="1" dur="indefinite" restart="never" nodeType="tmRoot"/>
+      </p:par>
+    </p:tnLst>
+  </p:timing>
+</p:sld>
+</file>
+
+<file path=ppt/slides/slide14.xml><?xml version="1.0" encoding="utf-8"?>
+<p:sld xmlns:a="http://schemas.openxmlformats.org/drawingml/2006/main" xmlns:r="http://schemas.openxmlformats.org/officeDocument/2006/relationships" xmlns:p="http://schemas.openxmlformats.org/presentationml/2006/main">
+  <p:cSld>
+    <p:spTree>
+      <p:nvGrpSpPr>
+        <p:cNvPr id="1" name=""/>
+        <p:cNvGrpSpPr/>
+        <p:nvPr/>
+      </p:nvGrpSpPr>
+      <p:grpSpPr>
+        <a:xfrm>
+          <a:off x="0" y="0"/>
+          <a:ext cx="0" cy="0"/>
+          <a:chOff x="0" y="0"/>
+          <a:chExt cx="0" cy="0"/>
+        </a:xfrm>
+      </p:grpSpPr>
+      <p:sp>
+        <p:nvSpPr>
+          <p:cNvPr id="2" name="Title 1"/>
+          <p:cNvSpPr>
+            <a:spLocks noGrp="1"/>
+          </p:cNvSpPr>
+          <p:nvPr>
+            <p:ph type="title"/>
+          </p:nvPr>
+        </p:nvSpPr>
+        <p:spPr/>
+        <p:txBody>
+          <a:bodyPr/>
+          <a:lstStyle/>
+          <a:p>
+            <a:r>
+              <a:rPr lang="de-CH" dirty="0" smtClean="0"/>
+              <a:t>Resources</a:t>
+            </a:r>
+            <a:endParaRPr lang="de-CH" dirty="0"/>
+          </a:p>
+        </p:txBody>
+      </p:sp>
+      <p:sp>
+        <p:nvSpPr>
+          <p:cNvPr id="3" name="Content Placeholder 2"/>
+          <p:cNvSpPr>
+            <a:spLocks noGrp="1"/>
+          </p:cNvSpPr>
+          <p:nvPr>
+            <p:ph idx="1"/>
+          </p:nvPr>
+        </p:nvSpPr>
+        <p:spPr/>
+        <p:txBody>
+          <a:bodyPr/>
+          <a:lstStyle/>
+          <a:p>
+            <a:pPr>
+              <a:buFont typeface="Wingdings" panose="05000000000000000000" pitchFamily="2" charset="2"/>
+              <a:buChar char="§"/>
+            </a:pPr>
+            <a:r>
               <a:rPr lang="de-CH" dirty="0" smtClean="0"/>
               <a:t> Blog post available at my blog</a:t>
             </a:r>
@@ -4723,6 +5318,134 @@
     <p:extLst>
       <p:ext uri="{BB962C8B-B14F-4D97-AF65-F5344CB8AC3E}">
         <p14:creationId xmlns:p14="http://schemas.microsoft.com/office/powerpoint/2010/main" val="3908669481"/>
+      </p:ext>
+    </p:extLst>
+  </p:cSld>
+  <p:clrMapOvr>
+    <a:masterClrMapping/>
+  </p:clrMapOvr>
+  <p:timing>
+    <p:tnLst>
+      <p:par>
+        <p:cTn id="1" dur="indefinite" restart="never" nodeType="tmRoot"/>
+      </p:par>
+    </p:tnLst>
+  </p:timing>
+</p:sld>
+</file>
+
+<file path=ppt/slides/slide15.xml><?xml version="1.0" encoding="utf-8"?>
+<p:sld xmlns:a="http://schemas.openxmlformats.org/drawingml/2006/main" xmlns:r="http://schemas.openxmlformats.org/officeDocument/2006/relationships" xmlns:p="http://schemas.openxmlformats.org/presentationml/2006/main">
+  <p:cSld>
+    <p:spTree>
+      <p:nvGrpSpPr>
+        <p:cNvPr id="1" name=""/>
+        <p:cNvGrpSpPr/>
+        <p:nvPr/>
+      </p:nvGrpSpPr>
+      <p:grpSpPr>
+        <a:xfrm>
+          <a:off x="0" y="0"/>
+          <a:ext cx="0" cy="0"/>
+          <a:chOff x="0" y="0"/>
+          <a:chExt cx="0" cy="0"/>
+        </a:xfrm>
+      </p:grpSpPr>
+      <p:sp>
+        <p:nvSpPr>
+          <p:cNvPr id="2" name="Title 1"/>
+          <p:cNvSpPr>
+            <a:spLocks noGrp="1"/>
+          </p:cNvSpPr>
+          <p:nvPr>
+            <p:ph type="title"/>
+          </p:nvPr>
+        </p:nvSpPr>
+        <p:spPr/>
+        <p:txBody>
+          <a:bodyPr/>
+          <a:lstStyle/>
+          <a:p>
+            <a:r>
+              <a:rPr lang="de-CH" dirty="0" smtClean="0"/>
+              <a:t>Questions?</a:t>
+            </a:r>
+            <a:endParaRPr lang="de-CH" dirty="0"/>
+          </a:p>
+        </p:txBody>
+      </p:sp>
+      <p:sp>
+        <p:nvSpPr>
+          <p:cNvPr id="3" name="Content Placeholder 2"/>
+          <p:cNvSpPr>
+            <a:spLocks noGrp="1"/>
+          </p:cNvSpPr>
+          <p:nvPr>
+            <p:ph idx="1"/>
+          </p:nvPr>
+        </p:nvSpPr>
+        <p:spPr/>
+        <p:txBody>
+          <a:bodyPr/>
+          <a:lstStyle/>
+          <a:p>
+            <a:pPr marL="0" indent="0">
+              <a:buNone/>
+            </a:pPr>
+            <a:endParaRPr lang="de-CH" dirty="0"/>
+          </a:p>
+        </p:txBody>
+      </p:sp>
+      <p:sp>
+        <p:nvSpPr>
+          <p:cNvPr id="4" name="Date Placeholder 3"/>
+          <p:cNvSpPr>
+            <a:spLocks noGrp="1"/>
+          </p:cNvSpPr>
+          <p:nvPr>
+            <p:ph type="dt" sz="half" idx="10"/>
+          </p:nvPr>
+        </p:nvSpPr>
+        <p:spPr/>
+        <p:txBody>
+          <a:bodyPr/>
+          <a:lstStyle/>
+          <a:p>
+            <a:r>
+              <a:rPr lang="de-DE" smtClean="0"/>
+              <a:t>04.11.2014</a:t>
+            </a:r>
+            <a:endParaRPr lang="de-CH" dirty="0"/>
+          </a:p>
+        </p:txBody>
+      </p:sp>
+      <p:sp>
+        <p:nvSpPr>
+          <p:cNvPr id="5" name="Footer Placeholder 4"/>
+          <p:cNvSpPr>
+            <a:spLocks noGrp="1"/>
+          </p:cNvSpPr>
+          <p:nvPr>
+            <p:ph type="ftr" sz="quarter" idx="11"/>
+          </p:nvPr>
+        </p:nvSpPr>
+        <p:spPr/>
+        <p:txBody>
+          <a:bodyPr/>
+          <a:lstStyle/>
+          <a:p>
+            <a:r>
+              <a:rPr lang="de-CH" smtClean="0"/>
+              <a:t>Sitecore User Group Switzerland 2014 – Kevin Brechbühl</a:t>
+            </a:r>
+            <a:endParaRPr lang="de-CH" dirty="0"/>
+          </a:p>
+        </p:txBody>
+      </p:sp>
+    </p:spTree>
+    <p:extLst>
+      <p:ext uri="{BB962C8B-B14F-4D97-AF65-F5344CB8AC3E}">
+        <p14:creationId xmlns:p14="http://schemas.microsoft.com/office/powerpoint/2010/main" val="2601045119"/>
       </p:ext>
     </p:extLst>
   </p:cSld>
@@ -5094,7 +5817,7 @@
             </a:r>
             <a:r>
               <a:rPr lang="de-CH" dirty="0" smtClean="0"/>
-              <a:t>Dive into code</a:t>
+              <a:t>Demo with some code</a:t>
             </a:r>
             <a:endParaRPr lang="de-CH" dirty="0"/>
           </a:p>
@@ -6297,7 +7020,7 @@
           <a:p>
             <a:r>
               <a:rPr lang="de-CH" dirty="0" smtClean="0"/>
-              <a:t>Sitecore MVC</a:t>
+              <a:t>Three-layered architecture</a:t>
             </a:r>
             <a:endParaRPr lang="de-CH" dirty="0"/>
           </a:p>
@@ -6324,7 +7047,11 @@
             </a:pPr>
             <a:r>
               <a:rPr lang="de-CH" dirty="0" smtClean="0"/>
-              <a:t> Actually not necessary for this architecture</a:t>
+              <a:t> </a:t>
+            </a:r>
+            <a:r>
+              <a:rPr lang="de-CH" dirty="0" smtClean="0"/>
+              <a:t>Model is used over all layers to represent the data</a:t>
             </a:r>
           </a:p>
           <a:p>
@@ -6338,7 +7065,7 @@
             </a:r>
             <a:r>
               <a:rPr lang="de-CH" dirty="0" smtClean="0"/>
-              <a:t>Is used for this session and demo</a:t>
+              <a:t>Each layer only has access to it’s underlying layers</a:t>
             </a:r>
           </a:p>
           <a:p>
@@ -6346,7 +7073,14 @@
               <a:buFont typeface="Wingdings" panose="05000000000000000000" pitchFamily="2" charset="2"/>
               <a:buChar char="§"/>
             </a:pPr>
-            <a:endParaRPr lang="de-CH" dirty="0"/>
+            <a:r>
+              <a:rPr lang="de-CH" dirty="0"/>
+              <a:t> </a:t>
+            </a:r>
+            <a:r>
+              <a:rPr lang="de-CH" dirty="0" smtClean="0"/>
+              <a:t>Never allow the architecture to call layers the other way round</a:t>
+            </a:r>
           </a:p>
           <a:p>
             <a:pPr>
@@ -6354,24 +7088,13 @@
               <a:buChar char="§"/>
             </a:pPr>
             <a:r>
-              <a:rPr lang="de-CH" dirty="0" smtClean="0"/>
-              <a:t> Available since Sitecore 6.6</a:t>
-            </a:r>
-          </a:p>
-          <a:p>
-            <a:pPr>
-              <a:buFont typeface="Wingdings" panose="05000000000000000000" pitchFamily="2" charset="2"/>
-              <a:buChar char="§"/>
-            </a:pPr>
-            <a:r>
               <a:rPr lang="de-CH" dirty="0"/>
               <a:t> </a:t>
             </a:r>
             <a:r>
               <a:rPr lang="de-CH" dirty="0" smtClean="0"/>
-              <a:t>Enabled by default since Sitecore 7.1</a:t>
-            </a:r>
-            <a:endParaRPr lang="de-CH" dirty="0"/>
+              <a:t>A layer never knows what the other layers do and what the data is used for</a:t>
+            </a:r>
           </a:p>
         </p:txBody>
       </p:sp>
@@ -6424,7 +7147,7 @@
     </p:spTree>
     <p:extLst>
       <p:ext uri="{BB962C8B-B14F-4D97-AF65-F5344CB8AC3E}">
-        <p14:creationId xmlns:p14="http://schemas.microsoft.com/office/powerpoint/2010/main" val="724993621"/>
+        <p14:creationId xmlns:p14="http://schemas.microsoft.com/office/powerpoint/2010/main" val="718221579"/>
       </p:ext>
     </p:extLst>
   </p:cSld>
@@ -6475,7 +7198,7 @@
           <a:p>
             <a:r>
               <a:rPr lang="de-CH" dirty="0" smtClean="0"/>
-              <a:t>Glass Mapper</a:t>
+              <a:t>Frameworks we use</a:t>
             </a:r>
             <a:endParaRPr lang="de-CH" dirty="0"/>
           </a:p>
@@ -6502,7 +7225,11 @@
             </a:pPr>
             <a:r>
               <a:rPr lang="de-CH" dirty="0" smtClean="0"/>
-              <a:t> ORM (object-relational mapping) for Sitecore</a:t>
+              <a:t> </a:t>
+            </a:r>
+            <a:r>
+              <a:rPr lang="de-CH" dirty="0" smtClean="0"/>
+              <a:t>Sitecore MVC</a:t>
             </a:r>
           </a:p>
           <a:p>
@@ -6516,7 +7243,7 @@
             </a:r>
             <a:r>
               <a:rPr lang="de-CH" dirty="0" smtClean="0"/>
-              <a:t>Maps Sitecore items to strongly typed objects</a:t>
+              <a:t>Querying the database with Sitecore Glass Mapper</a:t>
             </a:r>
           </a:p>
           <a:p>
@@ -6524,7 +7251,14 @@
               <a:buFont typeface="Wingdings" panose="05000000000000000000" pitchFamily="2" charset="2"/>
               <a:buChar char="§"/>
             </a:pPr>
-            <a:endParaRPr lang="de-CH" dirty="0"/>
+            <a:r>
+              <a:rPr lang="de-CH" dirty="0"/>
+              <a:t> </a:t>
+            </a:r>
+            <a:r>
+              <a:rPr lang="de-CH" dirty="0" smtClean="0"/>
+              <a:t>Using dependency injection with Ninject</a:t>
+            </a:r>
           </a:p>
           <a:p>
             <a:pPr>
@@ -6536,77 +7270,13 @@
               <a:t> </a:t>
             </a:r>
             <a:r>
-              <a:rPr lang="de-CH" dirty="0">
-                <a:hlinkClick r:id="rId2"/>
-              </a:rPr>
-              <a:t>http://glass.lu</a:t>
-            </a:r>
-            <a:r>
-              <a:rPr lang="de-CH" dirty="0" smtClean="0">
-                <a:hlinkClick r:id="rId2"/>
-              </a:rPr>
-              <a:t>/</a:t>
-            </a:r>
-            <a:endParaRPr lang="de-CH" dirty="0" smtClean="0"/>
-          </a:p>
-          <a:p>
-            <a:pPr>
-              <a:buFont typeface="Wingdings" panose="05000000000000000000" pitchFamily="2" charset="2"/>
-              <a:buChar char="§"/>
-            </a:pPr>
-            <a:r>
-              <a:rPr lang="de-CH" dirty="0"/>
-              <a:t> </a:t>
-            </a:r>
-            <a:r>
               <a:rPr lang="de-CH" dirty="0" smtClean="0"/>
-              <a:t>Available via NuGet</a:t>
+              <a:t>Create basic unit tests with MSTest</a:t>
             </a:r>
             <a:endParaRPr lang="de-CH" dirty="0"/>
           </a:p>
         </p:txBody>
       </p:sp>
-      <p:pic>
-        <p:nvPicPr>
-          <p:cNvPr id="1026" name="Picture 2" descr="http://glass.lu/~/media/Images/Common/logo-250-with-border.ashx?w=150&amp;data_id=myvalue"/>
-          <p:cNvPicPr>
-            <a:picLocks noChangeAspect="1" noChangeArrowheads="1"/>
-          </p:cNvPicPr>
-          <p:nvPr/>
-        </p:nvPicPr>
-        <p:blipFill>
-          <a:blip r:embed="rId3">
-            <a:extLst>
-              <a:ext uri="{28A0092B-C50C-407E-A947-70E740481C1C}">
-                <a14:useLocalDpi xmlns:a14="http://schemas.microsoft.com/office/drawing/2010/main" val="0"/>
-              </a:ext>
-            </a:extLst>
-          </a:blip>
-          <a:srcRect/>
-          <a:stretch>
-            <a:fillRect/>
-          </a:stretch>
-        </p:blipFill>
-        <p:spPr bwMode="auto">
-          <a:xfrm>
-            <a:off x="8480454" y="1671382"/>
-            <a:ext cx="2296416" cy="2296416"/>
-          </a:xfrm>
-          <a:prstGeom prst="rect">
-            <a:avLst/>
-          </a:prstGeom>
-          <a:noFill/>
-          <a:extLst>
-            <a:ext uri="{909E8E84-426E-40DD-AFC4-6F175D3DCCD1}">
-              <a14:hiddenFill xmlns:a14="http://schemas.microsoft.com/office/drawing/2010/main">
-                <a:solidFill>
-                  <a:srgbClr val="FFFFFF"/>
-                </a:solidFill>
-              </a14:hiddenFill>
-            </a:ext>
-          </a:extLst>
-        </p:spPr>
-      </p:pic>
       <p:sp>
         <p:nvSpPr>
           <p:cNvPr id="4" name="Date Placeholder 3"/>
@@ -6656,7 +7326,7 @@
     </p:spTree>
     <p:extLst>
       <p:ext uri="{BB962C8B-B14F-4D97-AF65-F5344CB8AC3E}">
-        <p14:creationId xmlns:p14="http://schemas.microsoft.com/office/powerpoint/2010/main" val="2705697736"/>
+        <p14:creationId xmlns:p14="http://schemas.microsoft.com/office/powerpoint/2010/main" val="724993621"/>
       </p:ext>
     </p:extLst>
   </p:cSld>
@@ -6707,7 +7377,7 @@
           <a:p>
             <a:r>
               <a:rPr lang="de-CH" dirty="0" smtClean="0"/>
-              <a:t>Ninject</a:t>
+              <a:t>Sitecore MVC</a:t>
             </a:r>
             <a:endParaRPr lang="de-CH" dirty="0"/>
           </a:p>
@@ -6734,7 +7404,7 @@
             </a:pPr>
             <a:r>
               <a:rPr lang="de-CH" dirty="0" smtClean="0"/>
-              <a:t> Very easy dependency injection framework</a:t>
+              <a:t> Actually not necessary for this architecture</a:t>
             </a:r>
           </a:p>
           <a:p>
@@ -6748,21 +7418,7 @@
             </a:r>
             <a:r>
               <a:rPr lang="de-CH" dirty="0" smtClean="0"/>
-              <a:t>Supports ASP.net MVC controller injection</a:t>
-            </a:r>
-          </a:p>
-          <a:p>
-            <a:pPr>
-              <a:buFont typeface="Wingdings" panose="05000000000000000000" pitchFamily="2" charset="2"/>
-              <a:buChar char="§"/>
-            </a:pPr>
-            <a:r>
-              <a:rPr lang="de-CH" dirty="0"/>
-              <a:t> </a:t>
-            </a:r>
-            <a:r>
-              <a:rPr lang="de-CH" dirty="0" smtClean="0"/>
-              <a:t>Of course you can use another framework as well</a:t>
+              <a:t>Is used for this session and demo</a:t>
             </a:r>
           </a:p>
           <a:p>
@@ -6778,24 +7434,8 @@
               <a:buChar char="§"/>
             </a:pPr>
             <a:r>
-              <a:rPr lang="de-CH" dirty="0"/>
-              <a:t> </a:t>
-            </a:r>
-            <a:r>
-              <a:rPr lang="de-CH" dirty="0">
-                <a:hlinkClick r:id="rId2"/>
-              </a:rPr>
-              <a:t>http://www.ninject.org</a:t>
-            </a:r>
-            <a:r>
-              <a:rPr lang="de-CH" dirty="0" smtClean="0">
-                <a:hlinkClick r:id="rId2"/>
-              </a:rPr>
-              <a:t>/</a:t>
-            </a:r>
-            <a:r>
               <a:rPr lang="de-CH" dirty="0" smtClean="0"/>
-              <a:t> </a:t>
+              <a:t> Available since Sitecore 6.6</a:t>
             </a:r>
           </a:p>
           <a:p>
@@ -6809,53 +7449,12 @@
             </a:r>
             <a:r>
               <a:rPr lang="de-CH" dirty="0" smtClean="0"/>
-              <a:t>Available via NuGet</a:t>
+              <a:t>Enabled by default since Sitecore 7.1</a:t>
             </a:r>
             <a:endParaRPr lang="de-CH" dirty="0"/>
           </a:p>
         </p:txBody>
       </p:sp>
-      <p:pic>
-        <p:nvPicPr>
-          <p:cNvPr id="2054" name="Picture 6" descr="http://rlv.zcache.com/isapi/designall.dll?rlvnet=1&amp;realview=113228992575404873&amp;design=5ade5fc9-35ed-4f95-978d-86de1e25a069&amp;size=1.5&amp;style=round_sticker&amp;wm=0&amp;pending=false&amp;pdt=zazzle_sticker&amp;max_dim=512"/>
-          <p:cNvPicPr>
-            <a:picLocks noChangeAspect="1" noChangeArrowheads="1"/>
-          </p:cNvPicPr>
-          <p:nvPr/>
-        </p:nvPicPr>
-        <p:blipFill>
-          <a:blip r:embed="rId3">
-            <a:extLst>
-              <a:ext uri="{28A0092B-C50C-407E-A947-70E740481C1C}">
-                <a14:useLocalDpi xmlns:a14="http://schemas.microsoft.com/office/drawing/2010/main" val="0"/>
-              </a:ext>
-            </a:extLst>
-          </a:blip>
-          <a:srcRect/>
-          <a:stretch>
-            <a:fillRect/>
-          </a:stretch>
-        </p:blipFill>
-        <p:spPr bwMode="auto">
-          <a:xfrm>
-            <a:off x="7972271" y="1238081"/>
-            <a:ext cx="2991566" cy="2991567"/>
-          </a:xfrm>
-          <a:prstGeom prst="rect">
-            <a:avLst/>
-          </a:prstGeom>
-          <a:noFill/>
-          <a:extLst>
-            <a:ext uri="{909E8E84-426E-40DD-AFC4-6F175D3DCCD1}">
-              <a14:hiddenFill xmlns:a14="http://schemas.microsoft.com/office/drawing/2010/main">
-                <a:solidFill>
-                  <a:srgbClr val="FFFFFF"/>
-                </a:solidFill>
-              </a14:hiddenFill>
-            </a:ext>
-          </a:extLst>
-        </p:spPr>
-      </p:pic>
       <p:sp>
         <p:nvSpPr>
           <p:cNvPr id="4" name="Date Placeholder 3"/>
@@ -6905,7 +7504,7 @@
     </p:spTree>
     <p:extLst>
       <p:ext uri="{BB962C8B-B14F-4D97-AF65-F5344CB8AC3E}">
-        <p14:creationId xmlns:p14="http://schemas.microsoft.com/office/powerpoint/2010/main" val="5611312"/>
+        <p14:creationId xmlns:p14="http://schemas.microsoft.com/office/powerpoint/2010/main" val="4274713133"/>
       </p:ext>
     </p:extLst>
   </p:cSld>

</xml_diff>

<commit_message>
Describe class suffix for business and data layer.
</commit_message>
<xml_diff>
--- a/doc/ThreeLayeredArchitectureWithSitecore.pptx
+++ b/doc/ThreeLayeredArchitectureWithSitecore.pptx
@@ -5031,11 +5031,7 @@
             </a:r>
             <a:r>
               <a:rPr lang="de-CH" dirty="0" smtClean="0"/>
-              <a:t>We can abstract a lot and have many </a:t>
-            </a:r>
-            <a:r>
-              <a:rPr lang="de-CH" dirty="0" smtClean="0"/>
-              <a:t>advantages</a:t>
+              <a:t>We can abstract a lot and have many advantages</a:t>
             </a:r>
           </a:p>
           <a:p>
@@ -5059,7 +5055,6 @@
               <a:rPr lang="de-CH" dirty="0" smtClean="0"/>
               <a:t>ests</a:t>
             </a:r>
-            <a:endParaRPr lang="de-CH" dirty="0" smtClean="0"/>
           </a:p>
           <a:p>
             <a:pPr>
@@ -7047,11 +7042,7 @@
             </a:pPr>
             <a:r>
               <a:rPr lang="de-CH" dirty="0" smtClean="0"/>
-              <a:t> </a:t>
-            </a:r>
-            <a:r>
-              <a:rPr lang="de-CH" dirty="0" smtClean="0"/>
-              <a:t>Model is used over all layers to represent the data</a:t>
+              <a:t> Model is used over all layers to represent the data</a:t>
             </a:r>
           </a:p>
           <a:p>
@@ -7093,8 +7084,52 @@
             </a:r>
             <a:r>
               <a:rPr lang="de-CH" dirty="0" smtClean="0"/>
-              <a:t>A layer never knows what the other layers do and what the data is used for</a:t>
-            </a:r>
+              <a:t>A layer never knows what the other layers do and what the data is used </a:t>
+            </a:r>
+            <a:r>
+              <a:rPr lang="de-CH" dirty="0" smtClean="0"/>
+              <a:t>for</a:t>
+            </a:r>
+          </a:p>
+          <a:p>
+            <a:pPr>
+              <a:buFont typeface="Wingdings" panose="05000000000000000000" pitchFamily="2" charset="2"/>
+              <a:buChar char="§"/>
+            </a:pPr>
+            <a:endParaRPr lang="de-CH" dirty="0"/>
+          </a:p>
+          <a:p>
+            <a:pPr>
+              <a:buFont typeface="Wingdings" panose="05000000000000000000" pitchFamily="2" charset="2"/>
+              <a:buChar char="§"/>
+            </a:pPr>
+            <a:r>
+              <a:rPr lang="de-CH" dirty="0" smtClean="0"/>
+              <a:t> Classes from business layer gets the suffix </a:t>
+            </a:r>
+            <a:r>
+              <a:rPr lang="de-CH" i="1" dirty="0" smtClean="0"/>
+              <a:t>Service</a:t>
+            </a:r>
+          </a:p>
+          <a:p>
+            <a:pPr>
+              <a:buFont typeface="Wingdings" panose="05000000000000000000" pitchFamily="2" charset="2"/>
+              <a:buChar char="§"/>
+            </a:pPr>
+            <a:r>
+              <a:rPr lang="de-CH" dirty="0"/>
+              <a:t> </a:t>
+            </a:r>
+            <a:r>
+              <a:rPr lang="de-CH" dirty="0" smtClean="0"/>
+              <a:t>Classes from data layer gets the suffix </a:t>
+            </a:r>
+            <a:r>
+              <a:rPr lang="de-CH" i="1" dirty="0" smtClean="0"/>
+              <a:t>Repository</a:t>
+            </a:r>
+            <a:endParaRPr lang="de-CH" i="1" dirty="0" smtClean="0"/>
           </a:p>
         </p:txBody>
       </p:sp>
@@ -7225,11 +7260,7 @@
             </a:pPr>
             <a:r>
               <a:rPr lang="de-CH" dirty="0" smtClean="0"/>
-              <a:t> </a:t>
-            </a:r>
-            <a:r>
-              <a:rPr lang="de-CH" dirty="0" smtClean="0"/>
-              <a:t>Sitecore MVC</a:t>
+              <a:t> Sitecore MVC</a:t>
             </a:r>
           </a:p>
           <a:p>

</xml_diff>

<commit_message>
Update presentation after review.
</commit_message>
<xml_diff>
--- a/doc/ThreeLayeredArchitectureWithSitecore.pptx
+++ b/doc/ThreeLayeredArchitectureWithSitecore.pptx
@@ -17,8 +17,8 @@
     <p:sldId id="269" r:id="rId8"/>
     <p:sldId id="261" r:id="rId9"/>
     <p:sldId id="270" r:id="rId10"/>
-    <p:sldId id="266" r:id="rId11"/>
-    <p:sldId id="267" r:id="rId12"/>
+    <p:sldId id="267" r:id="rId11"/>
+    <p:sldId id="266" r:id="rId12"/>
     <p:sldId id="260" r:id="rId13"/>
     <p:sldId id="263" r:id="rId14"/>
     <p:sldId id="264" r:id="rId15"/>
@@ -211,7 +211,7 @@
           <a:p>
             <a:fld id="{6E2B9E00-1B23-4795-B282-C6B1ED02A73B}" type="datetimeFigureOut">
               <a:rPr lang="de-CH" smtClean="0"/>
-              <a:t>27.10.2014</a:t>
+              <a:t>01.11.2014</a:t>
             </a:fld>
             <a:endParaRPr lang="de-CH"/>
           </a:p>
@@ -607,7 +607,19 @@
           <a:bodyPr/>
           <a:lstStyle/>
           <a:p>
-            <a:endParaRPr lang="de-CH"/>
+            <a:pPr marL="171450" indent="-171450">
+              <a:buFontTx/>
+              <a:buChar char="-"/>
+            </a:pPr>
+            <a:r>
+              <a:rPr lang="de-CH" dirty="0" smtClean="0"/>
+              <a:t>M</a:t>
+            </a:r>
+            <a:r>
+              <a:rPr lang="de-CH" baseline="0" dirty="0" smtClean="0"/>
+              <a:t>aintanability: Unstructured code, every developer does it different, unclear which class/method does what</a:t>
+            </a:r>
+            <a:endParaRPr lang="de-CH" dirty="0" smtClean="0"/>
           </a:p>
         </p:txBody>
       </p:sp>
@@ -691,7 +703,15 @@
           <a:bodyPr/>
           <a:lstStyle/>
           <a:p>
-            <a:endParaRPr lang="de-CH"/>
+            <a:r>
+              <a:rPr lang="de-CH" dirty="0" smtClean="0"/>
+              <a:t>- Developer responsibilities:</a:t>
+            </a:r>
+            <a:r>
+              <a:rPr lang="de-CH" baseline="0" dirty="0" smtClean="0"/>
+              <a:t> Make it possible to split different implementation parts to different developers (e.g. Frontend does Frontend, WCF specialist does this etc.)</a:t>
+            </a:r>
+            <a:endParaRPr lang="de-CH" dirty="0"/>
           </a:p>
         </p:txBody>
       </p:sp>
@@ -732,6 +752,112 @@
 </file>
 
 <file path=ppt/notesSlides/notesSlide4.xml><?xml version="1.0" encoding="utf-8"?>
+<p:notes xmlns:a="http://schemas.openxmlformats.org/drawingml/2006/main" xmlns:r="http://schemas.openxmlformats.org/officeDocument/2006/relationships" xmlns:p="http://schemas.openxmlformats.org/presentationml/2006/main">
+  <p:cSld>
+    <p:spTree>
+      <p:nvGrpSpPr>
+        <p:cNvPr id="1" name=""/>
+        <p:cNvGrpSpPr/>
+        <p:nvPr/>
+      </p:nvGrpSpPr>
+      <p:grpSpPr>
+        <a:xfrm>
+          <a:off x="0" y="0"/>
+          <a:ext cx="0" cy="0"/>
+          <a:chOff x="0" y="0"/>
+          <a:chExt cx="0" cy="0"/>
+        </a:xfrm>
+      </p:grpSpPr>
+      <p:sp>
+        <p:nvSpPr>
+          <p:cNvPr id="2" name="Slide Image Placeholder 1"/>
+          <p:cNvSpPr>
+            <a:spLocks noGrp="1" noRot="1" noChangeAspect="1"/>
+          </p:cNvSpPr>
+          <p:nvPr>
+            <p:ph type="sldImg"/>
+          </p:nvPr>
+        </p:nvSpPr>
+        <p:spPr/>
+      </p:sp>
+      <p:sp>
+        <p:nvSpPr>
+          <p:cNvPr id="3" name="Notes Placeholder 2"/>
+          <p:cNvSpPr>
+            <a:spLocks noGrp="1"/>
+          </p:cNvSpPr>
+          <p:nvPr>
+            <p:ph type="body" idx="1"/>
+          </p:nvPr>
+        </p:nvSpPr>
+        <p:spPr/>
+        <p:txBody>
+          <a:bodyPr/>
+          <a:lstStyle/>
+          <a:p>
+            <a:pPr marL="171450" indent="-171450">
+              <a:buFontTx/>
+              <a:buChar char="-"/>
+            </a:pPr>
+            <a:r>
+              <a:rPr lang="de-CH" dirty="0" smtClean="0"/>
+              <a:t>Layers must</a:t>
+            </a:r>
+            <a:r>
+              <a:rPr lang="de-CH" baseline="0" dirty="0" smtClean="0"/>
+              <a:t> be strictly separated (e.g. By different Visual Studio projecfts)</a:t>
+            </a:r>
+          </a:p>
+          <a:p>
+            <a:pPr marL="171450" indent="-171450">
+              <a:buFontTx/>
+              <a:buChar char="-"/>
+            </a:pPr>
+            <a:r>
+              <a:rPr lang="de-CH" baseline="0" dirty="0" smtClean="0"/>
+              <a:t>Model represents the data -&gt; could be DomainModel, ViewModel, depends on addition architecture requirements</a:t>
+            </a:r>
+            <a:endParaRPr lang="de-CH" dirty="0"/>
+          </a:p>
+        </p:txBody>
+      </p:sp>
+      <p:sp>
+        <p:nvSpPr>
+          <p:cNvPr id="4" name="Slide Number Placeholder 3"/>
+          <p:cNvSpPr>
+            <a:spLocks noGrp="1"/>
+          </p:cNvSpPr>
+          <p:nvPr>
+            <p:ph type="sldNum" sz="quarter" idx="10"/>
+          </p:nvPr>
+        </p:nvSpPr>
+        <p:spPr/>
+        <p:txBody>
+          <a:bodyPr/>
+          <a:lstStyle/>
+          <a:p>
+            <a:fld id="{D84A27AA-9F5E-4F01-A23B-9E06CF66E53B}" type="slidenum">
+              <a:rPr lang="de-CH" smtClean="0"/>
+              <a:t>6</a:t>
+            </a:fld>
+            <a:endParaRPr lang="de-CH"/>
+          </a:p>
+        </p:txBody>
+      </p:sp>
+    </p:spTree>
+    <p:extLst>
+      <p:ext uri="{BB962C8B-B14F-4D97-AF65-F5344CB8AC3E}">
+        <p14:creationId xmlns:p14="http://schemas.microsoft.com/office/powerpoint/2010/main" val="253865601"/>
+      </p:ext>
+    </p:extLst>
+  </p:cSld>
+  <p:clrMapOvr>
+    <a:masterClrMapping/>
+  </p:clrMapOvr>
+</p:notes>
+</file>
+
+<file path=ppt/notesSlides/notesSlide5.xml><?xml version="1.0" encoding="utf-8"?>
 <p:notes xmlns:a="http://schemas.openxmlformats.org/drawingml/2006/main" xmlns:r="http://schemas.openxmlformats.org/officeDocument/2006/relationships" xmlns:p="http://schemas.openxmlformats.org/presentationml/2006/main">
   <p:cSld>
     <p:spTree>
@@ -4304,6 +4430,262 @@
           <a:p>
             <a:r>
               <a:rPr lang="de-CH" dirty="0" smtClean="0"/>
+              <a:t>Ninject</a:t>
+            </a:r>
+            <a:endParaRPr lang="de-CH" dirty="0"/>
+          </a:p>
+        </p:txBody>
+      </p:sp>
+      <p:sp>
+        <p:nvSpPr>
+          <p:cNvPr id="3" name="Content Placeholder 2"/>
+          <p:cNvSpPr>
+            <a:spLocks noGrp="1"/>
+          </p:cNvSpPr>
+          <p:nvPr>
+            <p:ph idx="1"/>
+          </p:nvPr>
+        </p:nvSpPr>
+        <p:spPr/>
+        <p:txBody>
+          <a:bodyPr/>
+          <a:lstStyle/>
+          <a:p>
+            <a:pPr>
+              <a:buFont typeface="Wingdings" panose="05000000000000000000" pitchFamily="2" charset="2"/>
+              <a:buChar char="§"/>
+            </a:pPr>
+            <a:r>
+              <a:rPr lang="de-CH" dirty="0" smtClean="0"/>
+              <a:t> Very easy dependency injection framework</a:t>
+            </a:r>
+          </a:p>
+          <a:p>
+            <a:pPr>
+              <a:buFont typeface="Wingdings" panose="05000000000000000000" pitchFamily="2" charset="2"/>
+              <a:buChar char="§"/>
+            </a:pPr>
+            <a:r>
+              <a:rPr lang="de-CH" dirty="0"/>
+              <a:t> </a:t>
+            </a:r>
+            <a:r>
+              <a:rPr lang="de-CH" dirty="0" smtClean="0"/>
+              <a:t>Supports ASP.net MVC controller injection</a:t>
+            </a:r>
+          </a:p>
+          <a:p>
+            <a:pPr>
+              <a:buFont typeface="Wingdings" panose="05000000000000000000" pitchFamily="2" charset="2"/>
+              <a:buChar char="§"/>
+            </a:pPr>
+            <a:r>
+              <a:rPr lang="de-CH" dirty="0"/>
+              <a:t> </a:t>
+            </a:r>
+            <a:r>
+              <a:rPr lang="de-CH" dirty="0" smtClean="0"/>
+              <a:t>Fantastic logo and name </a:t>
+            </a:r>
+            <a:r>
+              <a:rPr lang="de-CH" dirty="0" smtClean="0">
+                <a:sym typeface="Wingdings" panose="05000000000000000000" pitchFamily="2" charset="2"/>
+              </a:rPr>
+              <a:t></a:t>
+            </a:r>
+            <a:endParaRPr lang="de-CH" dirty="0" smtClean="0"/>
+          </a:p>
+          <a:p>
+            <a:pPr>
+              <a:buFont typeface="Wingdings" panose="05000000000000000000" pitchFamily="2" charset="2"/>
+              <a:buChar char="§"/>
+            </a:pPr>
+            <a:endParaRPr lang="de-CH" dirty="0"/>
+          </a:p>
+          <a:p>
+            <a:pPr>
+              <a:buFont typeface="Wingdings" panose="05000000000000000000" pitchFamily="2" charset="2"/>
+              <a:buChar char="§"/>
+            </a:pPr>
+            <a:r>
+              <a:rPr lang="de-CH" dirty="0"/>
+              <a:t> </a:t>
+            </a:r>
+            <a:r>
+              <a:rPr lang="de-CH" dirty="0">
+                <a:hlinkClick r:id="rId2"/>
+              </a:rPr>
+              <a:t>http://www.ninject.org</a:t>
+            </a:r>
+            <a:r>
+              <a:rPr lang="de-CH" dirty="0" smtClean="0">
+                <a:hlinkClick r:id="rId2"/>
+              </a:rPr>
+              <a:t>/</a:t>
+            </a:r>
+            <a:r>
+              <a:rPr lang="de-CH" dirty="0" smtClean="0"/>
+              <a:t> </a:t>
+            </a:r>
+          </a:p>
+          <a:p>
+            <a:pPr>
+              <a:buFont typeface="Wingdings" panose="05000000000000000000" pitchFamily="2" charset="2"/>
+              <a:buChar char="§"/>
+            </a:pPr>
+            <a:r>
+              <a:rPr lang="de-CH" dirty="0"/>
+              <a:t> </a:t>
+            </a:r>
+            <a:r>
+              <a:rPr lang="de-CH" dirty="0" smtClean="0"/>
+              <a:t>Available via NuGet</a:t>
+            </a:r>
+            <a:endParaRPr lang="de-CH" dirty="0"/>
+          </a:p>
+        </p:txBody>
+      </p:sp>
+      <p:pic>
+        <p:nvPicPr>
+          <p:cNvPr id="2054" name="Picture 6" descr="http://rlv.zcache.com/isapi/designall.dll?rlvnet=1&amp;realview=113228992575404873&amp;design=5ade5fc9-35ed-4f95-978d-86de1e25a069&amp;size=1.5&amp;style=round_sticker&amp;wm=0&amp;pending=false&amp;pdt=zazzle_sticker&amp;max_dim=512"/>
+          <p:cNvPicPr>
+            <a:picLocks noChangeAspect="1" noChangeArrowheads="1"/>
+          </p:cNvPicPr>
+          <p:nvPr/>
+        </p:nvPicPr>
+        <p:blipFill>
+          <a:blip r:embed="rId3">
+            <a:extLst>
+              <a:ext uri="{28A0092B-C50C-407E-A947-70E740481C1C}">
+                <a14:useLocalDpi xmlns:a14="http://schemas.microsoft.com/office/drawing/2010/main" val="0"/>
+              </a:ext>
+            </a:extLst>
+          </a:blip>
+          <a:srcRect/>
+          <a:stretch>
+            <a:fillRect/>
+          </a:stretch>
+        </p:blipFill>
+        <p:spPr bwMode="auto">
+          <a:xfrm>
+            <a:off x="7972271" y="1238081"/>
+            <a:ext cx="2991566" cy="2991567"/>
+          </a:xfrm>
+          <a:prstGeom prst="rect">
+            <a:avLst/>
+          </a:prstGeom>
+          <a:noFill/>
+          <a:extLst>
+            <a:ext uri="{909E8E84-426E-40DD-AFC4-6F175D3DCCD1}">
+              <a14:hiddenFill xmlns:a14="http://schemas.microsoft.com/office/drawing/2010/main">
+                <a:solidFill>
+                  <a:srgbClr val="FFFFFF"/>
+                </a:solidFill>
+              </a14:hiddenFill>
+            </a:ext>
+          </a:extLst>
+        </p:spPr>
+      </p:pic>
+      <p:sp>
+        <p:nvSpPr>
+          <p:cNvPr id="4" name="Date Placeholder 3"/>
+          <p:cNvSpPr>
+            <a:spLocks noGrp="1"/>
+          </p:cNvSpPr>
+          <p:nvPr>
+            <p:ph type="dt" sz="half" idx="10"/>
+          </p:nvPr>
+        </p:nvSpPr>
+        <p:spPr/>
+        <p:txBody>
+          <a:bodyPr/>
+          <a:lstStyle/>
+          <a:p>
+            <a:r>
+              <a:rPr lang="de-DE" smtClean="0"/>
+              <a:t>04.11.2014</a:t>
+            </a:r>
+            <a:endParaRPr lang="de-CH" dirty="0"/>
+          </a:p>
+        </p:txBody>
+      </p:sp>
+      <p:sp>
+        <p:nvSpPr>
+          <p:cNvPr id="5" name="Footer Placeholder 4"/>
+          <p:cNvSpPr>
+            <a:spLocks noGrp="1"/>
+          </p:cNvSpPr>
+          <p:nvPr>
+            <p:ph type="ftr" sz="quarter" idx="11"/>
+          </p:nvPr>
+        </p:nvSpPr>
+        <p:spPr/>
+        <p:txBody>
+          <a:bodyPr/>
+          <a:lstStyle/>
+          <a:p>
+            <a:r>
+              <a:rPr lang="de-CH" smtClean="0"/>
+              <a:t>Sitecore User Group Switzerland 2014 – Kevin Brechbühl</a:t>
+            </a:r>
+            <a:endParaRPr lang="de-CH" dirty="0"/>
+          </a:p>
+        </p:txBody>
+      </p:sp>
+    </p:spTree>
+    <p:extLst>
+      <p:ext uri="{BB962C8B-B14F-4D97-AF65-F5344CB8AC3E}">
+        <p14:creationId xmlns:p14="http://schemas.microsoft.com/office/powerpoint/2010/main" val="5611312"/>
+      </p:ext>
+    </p:extLst>
+  </p:cSld>
+  <p:clrMapOvr>
+    <a:masterClrMapping/>
+  </p:clrMapOvr>
+  <p:timing>
+    <p:tnLst>
+      <p:par>
+        <p:cTn id="1" dur="indefinite" restart="never" nodeType="tmRoot"/>
+      </p:par>
+    </p:tnLst>
+  </p:timing>
+</p:sld>
+</file>
+
+<file path=ppt/slides/slide11.xml><?xml version="1.0" encoding="utf-8"?>
+<p:sld xmlns:a="http://schemas.openxmlformats.org/drawingml/2006/main" xmlns:r="http://schemas.openxmlformats.org/officeDocument/2006/relationships" xmlns:p="http://schemas.openxmlformats.org/presentationml/2006/main">
+  <p:cSld>
+    <p:spTree>
+      <p:nvGrpSpPr>
+        <p:cNvPr id="1" name=""/>
+        <p:cNvGrpSpPr/>
+        <p:nvPr/>
+      </p:nvGrpSpPr>
+      <p:grpSpPr>
+        <a:xfrm>
+          <a:off x="0" y="0"/>
+          <a:ext cx="0" cy="0"/>
+          <a:chOff x="0" y="0"/>
+          <a:chExt cx="0" cy="0"/>
+        </a:xfrm>
+      </p:grpSpPr>
+      <p:sp>
+        <p:nvSpPr>
+          <p:cNvPr id="2" name="Title 1"/>
+          <p:cNvSpPr>
+            <a:spLocks noGrp="1"/>
+          </p:cNvSpPr>
+          <p:nvPr>
+            <p:ph type="title"/>
+          </p:nvPr>
+        </p:nvSpPr>
+        <p:spPr/>
+        <p:txBody>
+          <a:bodyPr/>
+          <a:lstStyle/>
+          <a:p>
+            <a:r>
+              <a:rPr lang="de-CH" dirty="0" smtClean="0"/>
               <a:t>Glass Mapper</a:t>
             </a:r>
             <a:endParaRPr lang="de-CH" dirty="0"/>
@@ -4502,255 +4884,6 @@
 </p:sld>
 </file>
 
-<file path=ppt/slides/slide11.xml><?xml version="1.0" encoding="utf-8"?>
-<p:sld xmlns:a="http://schemas.openxmlformats.org/drawingml/2006/main" xmlns:r="http://schemas.openxmlformats.org/officeDocument/2006/relationships" xmlns:p="http://schemas.openxmlformats.org/presentationml/2006/main">
-  <p:cSld>
-    <p:spTree>
-      <p:nvGrpSpPr>
-        <p:cNvPr id="1" name=""/>
-        <p:cNvGrpSpPr/>
-        <p:nvPr/>
-      </p:nvGrpSpPr>
-      <p:grpSpPr>
-        <a:xfrm>
-          <a:off x="0" y="0"/>
-          <a:ext cx="0" cy="0"/>
-          <a:chOff x="0" y="0"/>
-          <a:chExt cx="0" cy="0"/>
-        </a:xfrm>
-      </p:grpSpPr>
-      <p:sp>
-        <p:nvSpPr>
-          <p:cNvPr id="2" name="Title 1"/>
-          <p:cNvSpPr>
-            <a:spLocks noGrp="1"/>
-          </p:cNvSpPr>
-          <p:nvPr>
-            <p:ph type="title"/>
-          </p:nvPr>
-        </p:nvSpPr>
-        <p:spPr/>
-        <p:txBody>
-          <a:bodyPr/>
-          <a:lstStyle/>
-          <a:p>
-            <a:r>
-              <a:rPr lang="de-CH" dirty="0" smtClean="0"/>
-              <a:t>Ninject</a:t>
-            </a:r>
-            <a:endParaRPr lang="de-CH" dirty="0"/>
-          </a:p>
-        </p:txBody>
-      </p:sp>
-      <p:sp>
-        <p:nvSpPr>
-          <p:cNvPr id="3" name="Content Placeholder 2"/>
-          <p:cNvSpPr>
-            <a:spLocks noGrp="1"/>
-          </p:cNvSpPr>
-          <p:nvPr>
-            <p:ph idx="1"/>
-          </p:nvPr>
-        </p:nvSpPr>
-        <p:spPr/>
-        <p:txBody>
-          <a:bodyPr/>
-          <a:lstStyle/>
-          <a:p>
-            <a:pPr>
-              <a:buFont typeface="Wingdings" panose="05000000000000000000" pitchFamily="2" charset="2"/>
-              <a:buChar char="§"/>
-            </a:pPr>
-            <a:r>
-              <a:rPr lang="de-CH" dirty="0" smtClean="0"/>
-              <a:t> Very easy dependency injection framework</a:t>
-            </a:r>
-          </a:p>
-          <a:p>
-            <a:pPr>
-              <a:buFont typeface="Wingdings" panose="05000000000000000000" pitchFamily="2" charset="2"/>
-              <a:buChar char="§"/>
-            </a:pPr>
-            <a:r>
-              <a:rPr lang="de-CH" dirty="0"/>
-              <a:t> </a:t>
-            </a:r>
-            <a:r>
-              <a:rPr lang="de-CH" dirty="0" smtClean="0"/>
-              <a:t>Supports ASP.net MVC controller injection</a:t>
-            </a:r>
-          </a:p>
-          <a:p>
-            <a:pPr>
-              <a:buFont typeface="Wingdings" panose="05000000000000000000" pitchFamily="2" charset="2"/>
-              <a:buChar char="§"/>
-            </a:pPr>
-            <a:r>
-              <a:rPr lang="de-CH" dirty="0"/>
-              <a:t> </a:t>
-            </a:r>
-            <a:r>
-              <a:rPr lang="de-CH" dirty="0" smtClean="0"/>
-              <a:t>Of course you can use another framework as well</a:t>
-            </a:r>
-          </a:p>
-          <a:p>
-            <a:pPr>
-              <a:buFont typeface="Wingdings" panose="05000000000000000000" pitchFamily="2" charset="2"/>
-              <a:buChar char="§"/>
-            </a:pPr>
-            <a:endParaRPr lang="de-CH" dirty="0"/>
-          </a:p>
-          <a:p>
-            <a:pPr>
-              <a:buFont typeface="Wingdings" panose="05000000000000000000" pitchFamily="2" charset="2"/>
-              <a:buChar char="§"/>
-            </a:pPr>
-            <a:r>
-              <a:rPr lang="de-CH" dirty="0"/>
-              <a:t> </a:t>
-            </a:r>
-            <a:r>
-              <a:rPr lang="de-CH" dirty="0">
-                <a:hlinkClick r:id="rId2"/>
-              </a:rPr>
-              <a:t>http://www.ninject.org</a:t>
-            </a:r>
-            <a:r>
-              <a:rPr lang="de-CH" dirty="0" smtClean="0">
-                <a:hlinkClick r:id="rId2"/>
-              </a:rPr>
-              <a:t>/</a:t>
-            </a:r>
-            <a:r>
-              <a:rPr lang="de-CH" dirty="0" smtClean="0"/>
-              <a:t> </a:t>
-            </a:r>
-          </a:p>
-          <a:p>
-            <a:pPr>
-              <a:buFont typeface="Wingdings" panose="05000000000000000000" pitchFamily="2" charset="2"/>
-              <a:buChar char="§"/>
-            </a:pPr>
-            <a:r>
-              <a:rPr lang="de-CH" dirty="0"/>
-              <a:t> </a:t>
-            </a:r>
-            <a:r>
-              <a:rPr lang="de-CH" dirty="0" smtClean="0"/>
-              <a:t>Available via NuGet</a:t>
-            </a:r>
-            <a:endParaRPr lang="de-CH" dirty="0"/>
-          </a:p>
-        </p:txBody>
-      </p:sp>
-      <p:pic>
-        <p:nvPicPr>
-          <p:cNvPr id="2054" name="Picture 6" descr="http://rlv.zcache.com/isapi/designall.dll?rlvnet=1&amp;realview=113228992575404873&amp;design=5ade5fc9-35ed-4f95-978d-86de1e25a069&amp;size=1.5&amp;style=round_sticker&amp;wm=0&amp;pending=false&amp;pdt=zazzle_sticker&amp;max_dim=512"/>
-          <p:cNvPicPr>
-            <a:picLocks noChangeAspect="1" noChangeArrowheads="1"/>
-          </p:cNvPicPr>
-          <p:nvPr/>
-        </p:nvPicPr>
-        <p:blipFill>
-          <a:blip r:embed="rId3">
-            <a:extLst>
-              <a:ext uri="{28A0092B-C50C-407E-A947-70E740481C1C}">
-                <a14:useLocalDpi xmlns:a14="http://schemas.microsoft.com/office/drawing/2010/main" val="0"/>
-              </a:ext>
-            </a:extLst>
-          </a:blip>
-          <a:srcRect/>
-          <a:stretch>
-            <a:fillRect/>
-          </a:stretch>
-        </p:blipFill>
-        <p:spPr bwMode="auto">
-          <a:xfrm>
-            <a:off x="7972271" y="1238081"/>
-            <a:ext cx="2991566" cy="2991567"/>
-          </a:xfrm>
-          <a:prstGeom prst="rect">
-            <a:avLst/>
-          </a:prstGeom>
-          <a:noFill/>
-          <a:extLst>
-            <a:ext uri="{909E8E84-426E-40DD-AFC4-6F175D3DCCD1}">
-              <a14:hiddenFill xmlns:a14="http://schemas.microsoft.com/office/drawing/2010/main">
-                <a:solidFill>
-                  <a:srgbClr val="FFFFFF"/>
-                </a:solidFill>
-              </a14:hiddenFill>
-            </a:ext>
-          </a:extLst>
-        </p:spPr>
-      </p:pic>
-      <p:sp>
-        <p:nvSpPr>
-          <p:cNvPr id="4" name="Date Placeholder 3"/>
-          <p:cNvSpPr>
-            <a:spLocks noGrp="1"/>
-          </p:cNvSpPr>
-          <p:nvPr>
-            <p:ph type="dt" sz="half" idx="10"/>
-          </p:nvPr>
-        </p:nvSpPr>
-        <p:spPr/>
-        <p:txBody>
-          <a:bodyPr/>
-          <a:lstStyle/>
-          <a:p>
-            <a:r>
-              <a:rPr lang="de-DE" smtClean="0"/>
-              <a:t>04.11.2014</a:t>
-            </a:r>
-            <a:endParaRPr lang="de-CH" dirty="0"/>
-          </a:p>
-        </p:txBody>
-      </p:sp>
-      <p:sp>
-        <p:nvSpPr>
-          <p:cNvPr id="5" name="Footer Placeholder 4"/>
-          <p:cNvSpPr>
-            <a:spLocks noGrp="1"/>
-          </p:cNvSpPr>
-          <p:nvPr>
-            <p:ph type="ftr" sz="quarter" idx="11"/>
-          </p:nvPr>
-        </p:nvSpPr>
-        <p:spPr/>
-        <p:txBody>
-          <a:bodyPr/>
-          <a:lstStyle/>
-          <a:p>
-            <a:r>
-              <a:rPr lang="de-CH" smtClean="0"/>
-              <a:t>Sitecore User Group Switzerland 2014 – Kevin Brechbühl</a:t>
-            </a:r>
-            <a:endParaRPr lang="de-CH" dirty="0"/>
-          </a:p>
-        </p:txBody>
-      </p:sp>
-    </p:spTree>
-    <p:extLst>
-      <p:ext uri="{BB962C8B-B14F-4D97-AF65-F5344CB8AC3E}">
-        <p14:creationId xmlns:p14="http://schemas.microsoft.com/office/powerpoint/2010/main" val="5611312"/>
-      </p:ext>
-    </p:extLst>
-  </p:cSld>
-  <p:clrMapOvr>
-    <a:masterClrMapping/>
-  </p:clrMapOvr>
-  <p:timing>
-    <p:tnLst>
-      <p:par>
-        <p:cTn id="1" dur="indefinite" restart="never" nodeType="tmRoot"/>
-      </p:par>
-    </p:tnLst>
-  </p:timing>
-</p:sld>
-</file>
-
 <file path=ppt/slides/slide12.xml><?xml version="1.0" encoding="utf-8"?>
 <p:sld xmlns:a="http://schemas.openxmlformats.org/drawingml/2006/main" xmlns:r="http://schemas.openxmlformats.org/officeDocument/2006/relationships" xmlns:p="http://schemas.openxmlformats.org/presentationml/2006/main">
   <p:cSld>
@@ -4812,7 +4945,11 @@
             </a:pPr>
             <a:r>
               <a:rPr lang="en-US" dirty="0" smtClean="0"/>
-              <a:t> Show list of news in a </a:t>
+              <a:t> Show </a:t>
+            </a:r>
+            <a:r>
+              <a:rPr lang="en-US" dirty="0" smtClean="0"/>
+              <a:t>list of news in a </a:t>
             </a:r>
             <a:r>
               <a:rPr lang="en-US" dirty="0" err="1" smtClean="0"/>
@@ -4834,15 +4971,11 @@
             </a:r>
             <a:r>
               <a:rPr lang="en-US" dirty="0" smtClean="0"/>
-              <a:t>Sort </a:t>
-            </a:r>
-            <a:r>
-              <a:rPr lang="en-US" smtClean="0"/>
-              <a:t>them descending </a:t>
+              <a:t>Sort them descending by </a:t>
             </a:r>
             <a:r>
               <a:rPr lang="en-US" dirty="0" smtClean="0"/>
-              <a:t>by date</a:t>
+              <a:t>date</a:t>
             </a:r>
           </a:p>
           <a:p>
@@ -4856,8 +4989,17 @@
             </a:r>
             <a:r>
               <a:rPr lang="en-US" dirty="0" smtClean="0"/>
-              <a:t>Get the items via Glass Mapper</a:t>
-            </a:r>
+              <a:t>Never use the </a:t>
+            </a:r>
+            <a:r>
+              <a:rPr lang="en-US" i="1" dirty="0" err="1" smtClean="0"/>
+              <a:t>Sitecore.Context</a:t>
+            </a:r>
+            <a:r>
+              <a:rPr lang="en-US" dirty="0" smtClean="0"/>
+              <a:t> to access data</a:t>
+            </a:r>
+            <a:endParaRPr lang="en-US" dirty="0" smtClean="0"/>
           </a:p>
           <a:p>
             <a:pPr>
@@ -4870,7 +5012,40 @@
             </a:r>
             <a:r>
               <a:rPr lang="en-US" dirty="0" smtClean="0"/>
-              <a:t>Abstract different layers into different Visual Studio projects</a:t>
+              <a:t>Go through the different layers to get and display the data</a:t>
+            </a:r>
+            <a:endParaRPr lang="en-US" dirty="0" smtClean="0"/>
+          </a:p>
+          <a:p>
+            <a:pPr>
+              <a:buFont typeface="Wingdings" panose="05000000000000000000" pitchFamily="2" charset="2"/>
+              <a:buChar char="§"/>
+            </a:pPr>
+            <a:r>
+              <a:rPr lang="en-US" dirty="0"/>
+              <a:t> </a:t>
+            </a:r>
+            <a:r>
+              <a:rPr lang="en-US" dirty="0" smtClean="0"/>
+              <a:t>Abstract different layers into different Visual Studio </a:t>
+            </a:r>
+            <a:r>
+              <a:rPr lang="en-US" dirty="0" smtClean="0"/>
+              <a:t>projects</a:t>
+            </a:r>
+          </a:p>
+          <a:p>
+            <a:pPr>
+              <a:buFont typeface="Wingdings" panose="05000000000000000000" pitchFamily="2" charset="2"/>
+              <a:buChar char="§"/>
+            </a:pPr>
+            <a:r>
+              <a:rPr lang="en-US" dirty="0"/>
+              <a:t> </a:t>
+            </a:r>
+            <a:r>
+              <a:rPr lang="en-US" dirty="0" smtClean="0"/>
+              <a:t>Simple unit tests</a:t>
             </a:r>
             <a:endParaRPr lang="de-CH" dirty="0" smtClean="0"/>
           </a:p>
@@ -5070,9 +5245,27 @@
             </a:pPr>
             <a:r>
               <a:rPr lang="de-CH" dirty="0" smtClean="0"/>
-              <a:t> It makes developer lifes easier and the code cleaner</a:t>
-            </a:r>
-            <a:endParaRPr lang="de-CH" dirty="0"/>
+              <a:t> It makes developer lifes easier and the code </a:t>
+            </a:r>
+            <a:r>
+              <a:rPr lang="de-CH" dirty="0" smtClean="0"/>
+              <a:t>cleaner</a:t>
+            </a:r>
+          </a:p>
+          <a:p>
+            <a:pPr>
+              <a:buFont typeface="Wingdings" panose="05000000000000000000" pitchFamily="2" charset="2"/>
+              <a:buChar char="§"/>
+            </a:pPr>
+            <a:r>
+              <a:rPr lang="de-CH" dirty="0"/>
+              <a:t> </a:t>
+            </a:r>
+            <a:r>
+              <a:rPr lang="de-CH" b="1" dirty="0" smtClean="0"/>
+              <a:t>Developers must understand the architecture and follow the rules</a:t>
+            </a:r>
+            <a:endParaRPr lang="de-CH" b="1" dirty="0"/>
           </a:p>
         </p:txBody>
       </p:sp>
@@ -5759,8 +5952,16 @@
               <a:buChar char="§"/>
             </a:pPr>
             <a:r>
-              <a:rPr lang="de-CH" dirty="0" smtClean="0"/>
-              <a:t> What do we have for issues?</a:t>
+              <a:rPr lang="de-CH" dirty="0"/>
+              <a:t> </a:t>
+            </a:r>
+            <a:r>
+              <a:rPr lang="de-CH" dirty="0" smtClean="0"/>
+              <a:t>Why are we talking about this topic?</a:t>
+            </a:r>
+            <a:r>
+              <a:rPr lang="de-CH" dirty="0" smtClean="0"/>
+              <a:t> </a:t>
             </a:r>
           </a:p>
           <a:p>
@@ -5770,8 +5971,9 @@
             </a:pPr>
             <a:r>
               <a:rPr lang="de-CH" dirty="0" smtClean="0"/>
-              <a:t> How could we possibly get rid of them?</a:t>
-            </a:r>
+              <a:t> What do we want to achieve?</a:t>
+            </a:r>
+            <a:endParaRPr lang="de-CH" dirty="0" smtClean="0"/>
           </a:p>
           <a:p>
             <a:pPr>
@@ -5784,8 +5986,9 @@
             </a:r>
             <a:r>
               <a:rPr lang="de-CH" dirty="0" smtClean="0"/>
-              <a:t>A bit of software architecture</a:t>
-            </a:r>
+              <a:t>Three-layered architecture</a:t>
+            </a:r>
+            <a:endParaRPr lang="de-CH" dirty="0" smtClean="0"/>
           </a:p>
           <a:p>
             <a:pPr>
@@ -5798,8 +6001,9 @@
             </a:r>
             <a:r>
               <a:rPr lang="de-CH" dirty="0" smtClean="0"/>
-              <a:t>Frameworks which help us solving many problems</a:t>
-            </a:r>
+              <a:t>Available frameworks</a:t>
+            </a:r>
+            <a:endParaRPr lang="de-CH" dirty="0" smtClean="0"/>
           </a:p>
           <a:p>
             <a:pPr>
@@ -5918,7 +6122,7 @@
           <a:p>
             <a:r>
               <a:rPr lang="de-CH" dirty="0" smtClean="0"/>
-              <a:t>Current Issues</a:t>
+              <a:t>Why are we talking about this topic?</a:t>
             </a:r>
             <a:endParaRPr lang="de-CH" dirty="0"/>
           </a:p>
@@ -5947,7 +6151,11 @@
             </a:pPr>
             <a:r>
               <a:rPr lang="de-CH" dirty="0" smtClean="0"/>
-              <a:t> Strong dependency to Sitecore and the database</a:t>
+              <a:t> </a:t>
+            </a:r>
+            <a:r>
+              <a:rPr lang="de-CH" dirty="0" smtClean="0"/>
+              <a:t>Unstructured code (one class does everything)</a:t>
             </a:r>
           </a:p>
           <a:p>
@@ -5961,7 +6169,7 @@
             </a:r>
             <a:r>
               <a:rPr lang="de-CH" dirty="0" smtClean="0"/>
-              <a:t>It’s hard to split different part of implementations to different developers</a:t>
+              <a:t>Code maintainability</a:t>
             </a:r>
           </a:p>
           <a:p>
@@ -5975,7 +6183,7 @@
             </a:r>
             <a:r>
               <a:rPr lang="de-CH" dirty="0" smtClean="0"/>
-              <a:t>It’s hard to change and maintain code</a:t>
+              <a:t>DRY = Don’t repeat yourself</a:t>
             </a:r>
           </a:p>
           <a:p>
@@ -5984,12 +6192,77 @@
               <a:buChar char="§"/>
             </a:pPr>
             <a:r>
+              <a:rPr lang="de-CH" dirty="0" smtClean="0"/>
+              <a:t> High developer skills needed</a:t>
+            </a:r>
+          </a:p>
+          <a:p>
+            <a:pPr marL="346075" lvl="1" indent="106363">
+              <a:buFont typeface="Wingdings" panose="05000000000000000000" pitchFamily="2" charset="2"/>
+              <a:buChar char="§"/>
+            </a:pPr>
+            <a:r>
+              <a:rPr lang="de-CH" dirty="0" smtClean="0"/>
+              <a:t> One application is implemented by one single developer </a:t>
+            </a:r>
+          </a:p>
+          <a:p>
+            <a:pPr marL="346075" lvl="1" indent="106363">
+              <a:buFont typeface="Wingdings" panose="05000000000000000000" pitchFamily="2" charset="2"/>
+              <a:buChar char="§"/>
+            </a:pPr>
+            <a:r>
+              <a:rPr lang="de-CH" dirty="0" smtClean="0"/>
+              <a:t> From presentation to data access</a:t>
+            </a:r>
+            <a:endParaRPr lang="de-CH" dirty="0" smtClean="0"/>
+          </a:p>
+          <a:p>
+            <a:pPr>
+              <a:buFont typeface="Wingdings" panose="05000000000000000000" pitchFamily="2" charset="2"/>
+              <a:buChar char="§"/>
+            </a:pPr>
+            <a:r>
+              <a:rPr lang="de-CH" dirty="0" smtClean="0"/>
+              <a:t> Strong </a:t>
+            </a:r>
+            <a:r>
               <a:rPr lang="de-CH" dirty="0"/>
+              <a:t>dependency to </a:t>
+            </a:r>
+            <a:r>
+              <a:rPr lang="de-CH" i="1" dirty="0" smtClean="0"/>
+              <a:t>HttpContext</a:t>
+            </a:r>
+            <a:r>
+              <a:rPr lang="de-CH" dirty="0" smtClean="0"/>
+              <a:t>, Sitecore </a:t>
+            </a:r>
+            <a:r>
+              <a:rPr lang="de-CH" dirty="0"/>
+              <a:t>and the </a:t>
+            </a:r>
+            <a:r>
+              <a:rPr lang="de-CH" dirty="0" smtClean="0"/>
+              <a:t>databases</a:t>
+            </a:r>
+            <a:r>
+              <a:rPr lang="de-CH" dirty="0" smtClean="0"/>
               <a:t> </a:t>
             </a:r>
-            <a:r>
-              <a:rPr lang="de-CH" dirty="0" smtClean="0"/>
-              <a:t>Unit testing</a:t>
+          </a:p>
+          <a:p>
+            <a:pPr>
+              <a:buFont typeface="Wingdings" panose="05000000000000000000" pitchFamily="2" charset="2"/>
+              <a:buChar char="§"/>
+            </a:pPr>
+            <a:r>
+              <a:rPr lang="de-CH" dirty="0" smtClean="0"/>
+              <a:t> Unit </a:t>
+            </a:r>
+            <a:r>
+              <a:rPr lang="de-CH" dirty="0" smtClean="0"/>
+              <a:t>testing</a:t>
             </a:r>
           </a:p>
         </p:txBody>
@@ -6094,7 +6367,7 @@
           <a:p>
             <a:r>
               <a:rPr lang="de-CH" dirty="0" smtClean="0"/>
-              <a:t>Solution?</a:t>
+              <a:t>What do we want to achieve?</a:t>
             </a:r>
             <a:endParaRPr lang="de-CH" dirty="0"/>
           </a:p>
@@ -6112,7 +6385,9 @@
         </p:nvSpPr>
         <p:spPr/>
         <p:txBody>
-          <a:bodyPr/>
+          <a:bodyPr>
+            <a:normAutofit/>
+          </a:bodyPr>
           <a:lstStyle/>
           <a:p>
             <a:pPr>
@@ -6120,9 +6395,103 @@
               <a:buChar char="§"/>
             </a:pPr>
             <a:r>
-              <a:rPr lang="de-CH" dirty="0" smtClean="0"/>
-              <a:t> Abstract all parts which have a dependency to Sitecore</a:t>
-            </a:r>
+              <a:rPr lang="de-CH" dirty="0"/>
+              <a:t>  Separation of </a:t>
+            </a:r>
+            <a:r>
+              <a:rPr lang="de-CH" dirty="0" smtClean="0"/>
+              <a:t>concerns</a:t>
+            </a:r>
+          </a:p>
+          <a:p>
+            <a:pPr marL="346075" lvl="1" indent="106363">
+              <a:buFont typeface="Wingdings" panose="05000000000000000000" pitchFamily="2" charset="2"/>
+              <a:buChar char="§"/>
+            </a:pPr>
+            <a:r>
+              <a:rPr lang="de-CH" dirty="0" smtClean="0"/>
+              <a:t> Code</a:t>
+            </a:r>
+            <a:r>
+              <a:rPr lang="de-CH" dirty="0" smtClean="0"/>
+              <a:t> parts are responsible for a single concern</a:t>
+            </a:r>
+          </a:p>
+          <a:p>
+            <a:pPr marL="346075" lvl="1" indent="106363">
+              <a:buFont typeface="Wingdings" panose="05000000000000000000" pitchFamily="2" charset="2"/>
+              <a:buChar char="§"/>
+            </a:pPr>
+            <a:r>
+              <a:rPr lang="de-CH" dirty="0"/>
+              <a:t> </a:t>
+            </a:r>
+            <a:r>
+              <a:rPr lang="de-CH" dirty="0" smtClean="0"/>
+              <a:t>Clean, structured and maintainable code</a:t>
+            </a:r>
+          </a:p>
+          <a:p>
+            <a:pPr marL="346075" lvl="1" indent="106363">
+              <a:buFont typeface="Wingdings" panose="05000000000000000000" pitchFamily="2" charset="2"/>
+              <a:buChar char="§"/>
+            </a:pPr>
+            <a:r>
+              <a:rPr lang="de-CH" dirty="0"/>
+              <a:t> Developer </a:t>
+            </a:r>
+            <a:r>
+              <a:rPr lang="de-CH" dirty="0" smtClean="0"/>
+              <a:t>responsibilities (e.g. Frontend, database access, web services)</a:t>
+            </a:r>
+          </a:p>
+          <a:p>
+            <a:pPr marL="90043" indent="106363">
+              <a:buFont typeface="Wingdings" panose="05000000000000000000" pitchFamily="2" charset="2"/>
+              <a:buChar char="§"/>
+            </a:pPr>
+            <a:r>
+              <a:rPr lang="de-CH" dirty="0"/>
+              <a:t> </a:t>
+            </a:r>
+            <a:r>
+              <a:rPr lang="de-CH" dirty="0" smtClean="0"/>
+              <a:t>Abstraction and decoupling</a:t>
+            </a:r>
+          </a:p>
+          <a:p>
+            <a:pPr marL="346075" lvl="1" indent="106363">
+              <a:buFont typeface="Wingdings" panose="05000000000000000000" pitchFamily="2" charset="2"/>
+              <a:buChar char="§"/>
+            </a:pPr>
+            <a:r>
+              <a:rPr lang="de-CH" dirty="0" smtClean="0"/>
+              <a:t> </a:t>
+            </a:r>
+            <a:r>
+              <a:rPr lang="de-CH" dirty="0"/>
+              <a:t>Abstract dependency to </a:t>
+            </a:r>
+            <a:r>
+              <a:rPr lang="de-CH" dirty="0" smtClean="0"/>
+              <a:t>Sitecore </a:t>
+            </a:r>
+          </a:p>
+          <a:p>
+            <a:pPr marL="346075" lvl="1" indent="106363">
+              <a:buFont typeface="Wingdings" panose="05000000000000000000" pitchFamily="2" charset="2"/>
+              <a:buChar char="§"/>
+            </a:pPr>
+            <a:r>
+              <a:rPr lang="de-CH" dirty="0" smtClean="0"/>
+              <a:t> Mocking and unit testing</a:t>
+            </a:r>
+          </a:p>
+          <a:p>
+            <a:pPr marL="346075" lvl="1" indent="0">
+              <a:buNone/>
+            </a:pPr>
+            <a:endParaRPr lang="de-CH" dirty="0" smtClean="0"/>
           </a:p>
           <a:p>
             <a:pPr>
@@ -6131,38 +6500,11 @@
             </a:pPr>
             <a:r>
               <a:rPr lang="de-CH" dirty="0" smtClean="0"/>
-              <a:t> Separation of concern – split different implementation parts</a:t>
-            </a:r>
-          </a:p>
-          <a:p>
-            <a:pPr>
-              <a:buFont typeface="Wingdings" panose="05000000000000000000" pitchFamily="2" charset="2"/>
-              <a:buChar char="§"/>
-            </a:pPr>
-            <a:r>
-              <a:rPr lang="de-CH" dirty="0"/>
-              <a:t> </a:t>
-            </a:r>
-            <a:r>
-              <a:rPr lang="de-CH" dirty="0" smtClean="0"/>
-              <a:t>Abstract and decouple different concerns</a:t>
-            </a:r>
-          </a:p>
-          <a:p>
-            <a:pPr>
-              <a:buFont typeface="Wingdings" panose="05000000000000000000" pitchFamily="2" charset="2"/>
-              <a:buChar char="§"/>
-            </a:pPr>
-            <a:endParaRPr lang="de-CH" dirty="0"/>
-          </a:p>
-          <a:p>
-            <a:pPr>
-              <a:buFont typeface="Wingdings" panose="05000000000000000000" pitchFamily="2" charset="2"/>
-              <a:buChar char="§"/>
-            </a:pPr>
-            <a:r>
-              <a:rPr lang="de-CH" dirty="0" smtClean="0"/>
-              <a:t> Common solution: Three-layered architecture</a:t>
+              <a:t> Common </a:t>
+            </a:r>
+            <a:r>
+              <a:rPr lang="de-CH" dirty="0" smtClean="0"/>
+              <a:t>solution: Three-layered architecture</a:t>
             </a:r>
             <a:endParaRPr lang="de-CH" dirty="0"/>
           </a:p>
@@ -6391,7 +6733,23 @@
             </a:br>
             <a:r>
               <a:rPr lang="de-CH" sz="1600" dirty="0" smtClean="0"/>
-              <a:t>(Controller Rendering, Razor View)</a:t>
+              <a:t>(Controller </a:t>
+            </a:r>
+            <a:r>
+              <a:rPr lang="de-CH" sz="1600" dirty="0" smtClean="0"/>
+              <a:t>rendering</a:t>
+            </a:r>
+            <a:r>
+              <a:rPr lang="de-CH" sz="1600" dirty="0" smtClean="0"/>
+              <a:t>, Razor </a:t>
+            </a:r>
+            <a:r>
+              <a:rPr lang="de-CH" sz="1600" dirty="0" smtClean="0"/>
+              <a:t>view</a:t>
+            </a:r>
+            <a:r>
+              <a:rPr lang="de-CH" sz="1600" dirty="0" smtClean="0"/>
+              <a:t>)</a:t>
             </a:r>
             <a:endParaRPr lang="de-CH" sz="1600" dirty="0"/>
           </a:p>
@@ -7015,7 +7373,7 @@
           <a:p>
             <a:r>
               <a:rPr lang="de-CH" dirty="0" smtClean="0"/>
-              <a:t>Three-layered architecture</a:t>
+              <a:t>Architecture rules</a:t>
             </a:r>
             <a:endParaRPr lang="de-CH" dirty="0"/>
           </a:p>
@@ -7042,7 +7400,11 @@
             </a:pPr>
             <a:r>
               <a:rPr lang="de-CH" dirty="0" smtClean="0"/>
-              <a:t> Model is used over all layers to represent the data</a:t>
+              <a:t> Each </a:t>
+            </a:r>
+            <a:r>
+              <a:rPr lang="de-CH" dirty="0" smtClean="0"/>
+              <a:t>layer only has access to it’s underlying layers</a:t>
             </a:r>
           </a:p>
           <a:p>
@@ -7056,8 +7418,21 @@
             </a:r>
             <a:r>
               <a:rPr lang="de-CH" dirty="0" smtClean="0"/>
-              <a:t>Each layer only has access to it’s underlying layers</a:t>
-            </a:r>
+              <a:t>Never allow </a:t>
+            </a:r>
+            <a:r>
+              <a:rPr lang="de-CH" dirty="0" smtClean="0"/>
+              <a:t>the architecture to </a:t>
+            </a:r>
+            <a:r>
+              <a:rPr lang="de-CH" dirty="0" smtClean="0"/>
+              <a:t>call layers the other way </a:t>
+            </a:r>
+            <a:r>
+              <a:rPr lang="de-CH" dirty="0" smtClean="0"/>
+              <a:t>around</a:t>
+            </a:r>
+            <a:endParaRPr lang="de-CH" dirty="0" smtClean="0"/>
           </a:p>
           <a:p>
             <a:pPr>
@@ -7070,25 +7445,7 @@
             </a:r>
             <a:r>
               <a:rPr lang="de-CH" dirty="0" smtClean="0"/>
-              <a:t>Never allow the architecture to call layers the other way round</a:t>
-            </a:r>
-          </a:p>
-          <a:p>
-            <a:pPr>
-              <a:buFont typeface="Wingdings" panose="05000000000000000000" pitchFamily="2" charset="2"/>
-              <a:buChar char="§"/>
-            </a:pPr>
-            <a:r>
-              <a:rPr lang="de-CH" dirty="0"/>
-              <a:t> </a:t>
-            </a:r>
-            <a:r>
-              <a:rPr lang="de-CH" dirty="0" smtClean="0"/>
-              <a:t>A layer never knows what the other layers do and what the data is used </a:t>
-            </a:r>
-            <a:r>
-              <a:rPr lang="de-CH" dirty="0" smtClean="0"/>
-              <a:t>for</a:t>
+              <a:t>A layer never knows what the other layers do and what the data is used for</a:t>
             </a:r>
           </a:p>
           <a:p>
@@ -7105,15 +7462,11 @@
             </a:pPr>
             <a:r>
               <a:rPr lang="de-CH" dirty="0" smtClean="0"/>
-              <a:t> Classes from business layer gets the suffix </a:t>
-            </a:r>
-            <a:r>
-              <a:rPr lang="de-CH" i="1" dirty="0" smtClean="0"/>
-              <a:t>Service</a:t>
-            </a:r>
-          </a:p>
-          <a:p>
-            <a:pPr>
+              <a:t> Proposal </a:t>
+            </a:r>
+          </a:p>
+          <a:p>
+            <a:pPr marL="346075" lvl="1" indent="106363">
               <a:buFont typeface="Wingdings" panose="05000000000000000000" pitchFamily="2" charset="2"/>
               <a:buChar char="§"/>
             </a:pPr>
@@ -7123,13 +7476,38 @@
             </a:r>
             <a:r>
               <a:rPr lang="de-CH" dirty="0" smtClean="0"/>
-              <a:t>Classes from data layer gets the suffix </a:t>
+              <a:t>Classes </a:t>
+            </a:r>
+            <a:r>
+              <a:rPr lang="de-CH" dirty="0" smtClean="0"/>
+              <a:t>from business layer gets the suffix </a:t>
+            </a:r>
+            <a:r>
+              <a:rPr lang="de-CH" i="1" dirty="0" smtClean="0"/>
+              <a:t>Service</a:t>
+            </a:r>
+          </a:p>
+          <a:p>
+            <a:pPr marL="346075" lvl="1" indent="106363">
+              <a:buFont typeface="Wingdings" panose="05000000000000000000" pitchFamily="2" charset="2"/>
+              <a:buChar char="§"/>
+            </a:pPr>
+            <a:r>
+              <a:rPr lang="de-CH" i="1" dirty="0"/>
+              <a:t> </a:t>
+            </a:r>
+            <a:r>
+              <a:rPr lang="de-CH" dirty="0" smtClean="0"/>
+              <a:t>Classes </a:t>
+            </a:r>
+            <a:r>
+              <a:rPr lang="de-CH" dirty="0" smtClean="0"/>
+              <a:t>from data layer gets the suffix </a:t>
             </a:r>
             <a:r>
               <a:rPr lang="de-CH" i="1" dirty="0" smtClean="0"/>
               <a:t>Repository</a:t>
             </a:r>
-            <a:endParaRPr lang="de-CH" i="1" dirty="0" smtClean="0"/>
           </a:p>
         </p:txBody>
       </p:sp>
@@ -7233,7 +7611,7 @@
           <a:p>
             <a:r>
               <a:rPr lang="de-CH" dirty="0" smtClean="0"/>
-              <a:t>Frameworks we use</a:t>
+              <a:t>Available frameworks</a:t>
             </a:r>
             <a:endParaRPr lang="de-CH" dirty="0"/>
           </a:p>
@@ -7260,7 +7638,17 @@
             </a:pPr>
             <a:r>
               <a:rPr lang="de-CH" dirty="0" smtClean="0"/>
-              <a:t> Sitecore MVC</a:t>
+              <a:t> </a:t>
+            </a:r>
+            <a:r>
+              <a:rPr lang="de-CH" dirty="0" smtClean="0"/>
+              <a:t>Decouple presentation, data and application logic </a:t>
+            </a:r>
+            <a:r>
+              <a:rPr lang="de-CH" dirty="0" smtClean="0">
+                <a:sym typeface="Wingdings" panose="05000000000000000000" pitchFamily="2" charset="2"/>
+              </a:rPr>
+              <a:t> Sitecore MVC</a:t>
             </a:r>
           </a:p>
           <a:p>
@@ -7269,12 +7657,16 @@
               <a:buChar char="§"/>
             </a:pPr>
             <a:r>
-              <a:rPr lang="de-CH" dirty="0"/>
+              <a:rPr lang="de-CH" dirty="0">
+                <a:sym typeface="Wingdings" panose="05000000000000000000" pitchFamily="2" charset="2"/>
+              </a:rPr>
               <a:t> </a:t>
             </a:r>
             <a:r>
-              <a:rPr lang="de-CH" dirty="0" smtClean="0"/>
-              <a:t>Querying the database with Sitecore Glass Mapper</a:t>
+              <a:rPr lang="de-CH" dirty="0" smtClean="0">
+                <a:sym typeface="Wingdings" panose="05000000000000000000" pitchFamily="2" charset="2"/>
+              </a:rPr>
+              <a:t>Loose coupling and dependency injection  Ninject</a:t>
             </a:r>
           </a:p>
           <a:p>
@@ -7283,13 +7675,18 @@
               <a:buChar char="§"/>
             </a:pPr>
             <a:r>
-              <a:rPr lang="de-CH" dirty="0"/>
+              <a:rPr lang="de-CH" dirty="0">
+                <a:sym typeface="Wingdings" panose="05000000000000000000" pitchFamily="2" charset="2"/>
+              </a:rPr>
               <a:t> </a:t>
             </a:r>
             <a:r>
-              <a:rPr lang="de-CH" dirty="0" smtClean="0"/>
-              <a:t>Using dependency injection with Ninject</a:t>
-            </a:r>
+              <a:rPr lang="de-CH" dirty="0" smtClean="0">
+                <a:sym typeface="Wingdings" panose="05000000000000000000" pitchFamily="2" charset="2"/>
+              </a:rPr>
+              <a:t>Sitecore abstraction  Glass Mapper</a:t>
+            </a:r>
+            <a:endParaRPr lang="de-CH" dirty="0" smtClean="0"/>
           </a:p>
           <a:p>
             <a:pPr>
@@ -7302,7 +7699,24 @@
             </a:r>
             <a:r>
               <a:rPr lang="de-CH" dirty="0" smtClean="0"/>
-              <a:t>Create basic unit tests with MSTest</a:t>
+              <a:t>Separation of concerns is given by the architecture</a:t>
+            </a:r>
+          </a:p>
+          <a:p>
+            <a:pPr>
+              <a:buFont typeface="Wingdings" panose="05000000000000000000" pitchFamily="2" charset="2"/>
+              <a:buChar char="§"/>
+            </a:pPr>
+            <a:endParaRPr lang="de-CH" dirty="0"/>
+          </a:p>
+          <a:p>
+            <a:pPr>
+              <a:buFont typeface="Wingdings" panose="05000000000000000000" pitchFamily="2" charset="2"/>
+              <a:buChar char="§"/>
+            </a:pPr>
+            <a:r>
+              <a:rPr lang="de-CH" dirty="0" smtClean="0"/>
+              <a:t> Choose the frameworks you prefer</a:t>
             </a:r>
             <a:endParaRPr lang="de-CH" dirty="0"/>
           </a:p>

</xml_diff>